<commit_message>
update for Scenic City
</commit_message>
<xml_diff>
--- a/IoTPresentation.pptx
+++ b/IoTPresentation.pptx
@@ -5,56 +5,57 @@
     <p:sldMasterId id="2147484043" r:id="rId1"/>
   </p:sldMasterIdLst>
   <p:notesMasterIdLst>
-    <p:notesMasterId r:id="rId49"/>
+    <p:notesMasterId r:id="rId50"/>
   </p:notesMasterIdLst>
   <p:sldIdLst>
     <p:sldId id="256" r:id="rId2"/>
-    <p:sldId id="257" r:id="rId3"/>
-    <p:sldId id="258" r:id="rId4"/>
-    <p:sldId id="259" r:id="rId5"/>
-    <p:sldId id="260" r:id="rId6"/>
-    <p:sldId id="261" r:id="rId7"/>
-    <p:sldId id="262" r:id="rId8"/>
-    <p:sldId id="263" r:id="rId9"/>
-    <p:sldId id="264" r:id="rId10"/>
-    <p:sldId id="265" r:id="rId11"/>
-    <p:sldId id="266" r:id="rId12"/>
-    <p:sldId id="269" r:id="rId13"/>
-    <p:sldId id="292" r:id="rId14"/>
-    <p:sldId id="293" r:id="rId15"/>
-    <p:sldId id="295" r:id="rId16"/>
-    <p:sldId id="294" r:id="rId17"/>
-    <p:sldId id="267" r:id="rId18"/>
-    <p:sldId id="268" r:id="rId19"/>
-    <p:sldId id="277" r:id="rId20"/>
-    <p:sldId id="270" r:id="rId21"/>
-    <p:sldId id="271" r:id="rId22"/>
-    <p:sldId id="272" r:id="rId23"/>
-    <p:sldId id="273" r:id="rId24"/>
-    <p:sldId id="274" r:id="rId25"/>
-    <p:sldId id="275" r:id="rId26"/>
-    <p:sldId id="276" r:id="rId27"/>
-    <p:sldId id="278" r:id="rId28"/>
-    <p:sldId id="296" r:id="rId29"/>
-    <p:sldId id="279" r:id="rId30"/>
-    <p:sldId id="280" r:id="rId31"/>
-    <p:sldId id="281" r:id="rId32"/>
-    <p:sldId id="282" r:id="rId33"/>
-    <p:sldId id="283" r:id="rId34"/>
-    <p:sldId id="284" r:id="rId35"/>
-    <p:sldId id="285" r:id="rId36"/>
-    <p:sldId id="298" r:id="rId37"/>
-    <p:sldId id="286" r:id="rId38"/>
-    <p:sldId id="300" r:id="rId39"/>
-    <p:sldId id="287" r:id="rId40"/>
-    <p:sldId id="288" r:id="rId41"/>
-    <p:sldId id="289" r:id="rId42"/>
-    <p:sldId id="290" r:id="rId43"/>
-    <p:sldId id="299" r:id="rId44"/>
-    <p:sldId id="291" r:id="rId45"/>
-    <p:sldId id="301" r:id="rId46"/>
-    <p:sldId id="302" r:id="rId47"/>
+    <p:sldId id="306" r:id="rId3"/>
+    <p:sldId id="257" r:id="rId4"/>
+    <p:sldId id="258" r:id="rId5"/>
+    <p:sldId id="259" r:id="rId6"/>
+    <p:sldId id="303" r:id="rId7"/>
+    <p:sldId id="260" r:id="rId8"/>
+    <p:sldId id="261" r:id="rId9"/>
+    <p:sldId id="262" r:id="rId10"/>
+    <p:sldId id="263" r:id="rId11"/>
+    <p:sldId id="264" r:id="rId12"/>
+    <p:sldId id="265" r:id="rId13"/>
+    <p:sldId id="266" r:id="rId14"/>
+    <p:sldId id="269" r:id="rId15"/>
+    <p:sldId id="292" r:id="rId16"/>
+    <p:sldId id="293" r:id="rId17"/>
+    <p:sldId id="295" r:id="rId18"/>
+    <p:sldId id="294" r:id="rId19"/>
+    <p:sldId id="267" r:id="rId20"/>
+    <p:sldId id="268" r:id="rId21"/>
+    <p:sldId id="277" r:id="rId22"/>
+    <p:sldId id="270" r:id="rId23"/>
+    <p:sldId id="271" r:id="rId24"/>
+    <p:sldId id="272" r:id="rId25"/>
+    <p:sldId id="273" r:id="rId26"/>
+    <p:sldId id="274" r:id="rId27"/>
+    <p:sldId id="275" r:id="rId28"/>
+    <p:sldId id="276" r:id="rId29"/>
+    <p:sldId id="278" r:id="rId30"/>
+    <p:sldId id="296" r:id="rId31"/>
+    <p:sldId id="279" r:id="rId32"/>
+    <p:sldId id="280" r:id="rId33"/>
+    <p:sldId id="281" r:id="rId34"/>
+    <p:sldId id="282" r:id="rId35"/>
+    <p:sldId id="283" r:id="rId36"/>
+    <p:sldId id="284" r:id="rId37"/>
+    <p:sldId id="285" r:id="rId38"/>
+    <p:sldId id="298" r:id="rId39"/>
+    <p:sldId id="286" r:id="rId40"/>
+    <p:sldId id="300" r:id="rId41"/>
+    <p:sldId id="287" r:id="rId42"/>
+    <p:sldId id="288" r:id="rId43"/>
+    <p:sldId id="289" r:id="rId44"/>
+    <p:sldId id="290" r:id="rId45"/>
+    <p:sldId id="299" r:id="rId46"/>
+    <p:sldId id="291" r:id="rId47"/>
     <p:sldId id="297" r:id="rId48"/>
+    <p:sldId id="305" r:id="rId49"/>
   </p:sldIdLst>
   <p:sldSz cx="12192000" cy="6858000"/>
   <p:notesSz cx="6858000" cy="9144000"/>
@@ -243,7 +244,7 @@
           <a:p>
             <a:fld id="{9E782643-A6B4-A044-95CE-1BD3A9149204}" type="datetimeFigureOut">
               <a:rPr lang="en-US" smtClean="0"/>
-              <a:t>7/28/18</a:t>
+              <a:t>10/2/19</a:t>
             </a:fld>
             <a:endParaRPr lang="en-US"/>
           </a:p>
@@ -575,7 +576,7 @@
           <a:p>
             <a:fld id="{380F7E09-06A7-404D-B3DF-8725B2B123BB}" type="slidenum">
               <a:rPr lang="en-US" smtClean="0"/>
-              <a:t>15</a:t>
+              <a:t>17</a:t>
             </a:fld>
             <a:endParaRPr lang="en-US"/>
           </a:p>
@@ -659,7 +660,7 @@
           <a:p>
             <a:fld id="{380F7E09-06A7-404D-B3DF-8725B2B123BB}" type="slidenum">
               <a:rPr lang="en-US" smtClean="0"/>
-              <a:t>37</a:t>
+              <a:t>39</a:t>
             </a:fld>
             <a:endParaRPr lang="en-US"/>
           </a:p>
@@ -669,90 +670,6 @@
     <p:extLst>
       <p:ext uri="{BB962C8B-B14F-4D97-AF65-F5344CB8AC3E}">
         <p14:creationId xmlns:p14="http://schemas.microsoft.com/office/powerpoint/2010/main" val="3786850582"/>
-      </p:ext>
-    </p:extLst>
-  </p:cSld>
-  <p:clrMapOvr>
-    <a:masterClrMapping/>
-  </p:clrMapOvr>
-</p:notes>
-</file>
-
-<file path=ppt/notesSlides/notesSlide3.xml><?xml version="1.0" encoding="utf-8"?>
-<p:notes xmlns:a="http://schemas.openxmlformats.org/drawingml/2006/main" xmlns:r="http://schemas.openxmlformats.org/officeDocument/2006/relationships" xmlns:p="http://schemas.openxmlformats.org/presentationml/2006/main">
-  <p:cSld>
-    <p:spTree>
-      <p:nvGrpSpPr>
-        <p:cNvPr id="1" name=""/>
-        <p:cNvGrpSpPr/>
-        <p:nvPr/>
-      </p:nvGrpSpPr>
-      <p:grpSpPr>
-        <a:xfrm>
-          <a:off x="0" y="0"/>
-          <a:ext cx="0" cy="0"/>
-          <a:chOff x="0" y="0"/>
-          <a:chExt cx="0" cy="0"/>
-        </a:xfrm>
-      </p:grpSpPr>
-      <p:sp>
-        <p:nvSpPr>
-          <p:cNvPr id="2" name="Slide Image Placeholder 1"/>
-          <p:cNvSpPr>
-            <a:spLocks noGrp="1" noRot="1" noChangeAspect="1"/>
-          </p:cNvSpPr>
-          <p:nvPr>
-            <p:ph type="sldImg"/>
-          </p:nvPr>
-        </p:nvSpPr>
-        <p:spPr/>
-      </p:sp>
-      <p:sp>
-        <p:nvSpPr>
-          <p:cNvPr id="3" name="Notes Placeholder 2"/>
-          <p:cNvSpPr>
-            <a:spLocks noGrp="1"/>
-          </p:cNvSpPr>
-          <p:nvPr>
-            <p:ph type="body" idx="1"/>
-          </p:nvPr>
-        </p:nvSpPr>
-        <p:spPr/>
-        <p:txBody>
-          <a:bodyPr/>
-          <a:lstStyle/>
-          <a:p>
-            <a:endParaRPr lang="en-US"/>
-          </a:p>
-        </p:txBody>
-      </p:sp>
-      <p:sp>
-        <p:nvSpPr>
-          <p:cNvPr id="4" name="Slide Number Placeholder 3"/>
-          <p:cNvSpPr>
-            <a:spLocks noGrp="1"/>
-          </p:cNvSpPr>
-          <p:nvPr>
-            <p:ph type="sldNum" sz="quarter" idx="10"/>
-          </p:nvPr>
-        </p:nvSpPr>
-        <p:spPr/>
-        <p:txBody>
-          <a:bodyPr/>
-          <a:lstStyle/>
-          <a:p>
-            <a:fld id="{470171FF-96A1-7D4A-AA25-C4377DE34A9D}" type="slidenum">
-              <a:rPr lang="en-US" smtClean="0"/>
-              <a:t>46</a:t>
-            </a:fld>
-            <a:endParaRPr lang="en-US"/>
-          </a:p>
-        </p:txBody>
-      </p:sp>
-    </p:spTree>
-    <p:extLst>
-      <p:ext uri="{BB962C8B-B14F-4D97-AF65-F5344CB8AC3E}">
-        <p14:creationId xmlns:p14="http://schemas.microsoft.com/office/powerpoint/2010/main" val="1391392537"/>
       </p:ext>
     </p:extLst>
   </p:cSld>
@@ -1007,7 +924,7 @@
           <a:p>
             <a:fld id="{3C8A4772-B952-DE4D-B887-74F2F545B670}" type="datetimeFigureOut">
               <a:rPr lang="en-US" smtClean="0"/>
-              <a:t>7/28/18</a:t>
+              <a:t>10/2/19</a:t>
             </a:fld>
             <a:endParaRPr lang="en-US"/>
           </a:p>
@@ -1269,7 +1186,7 @@
           <a:p>
             <a:fld id="{3C8A4772-B952-DE4D-B887-74F2F545B670}" type="datetimeFigureOut">
               <a:rPr lang="en-US" smtClean="0"/>
-              <a:t>7/28/18</a:t>
+              <a:t>10/2/19</a:t>
             </a:fld>
             <a:endParaRPr lang="en-US"/>
           </a:p>
@@ -1504,7 +1421,7 @@
           <a:p>
             <a:fld id="{3C8A4772-B952-DE4D-B887-74F2F545B670}" type="datetimeFigureOut">
               <a:rPr lang="en-US" smtClean="0"/>
-              <a:t>7/28/18</a:t>
+              <a:t>10/2/19</a:t>
             </a:fld>
             <a:endParaRPr lang="en-US"/>
           </a:p>
@@ -1744,7 +1661,7 @@
           <a:p>
             <a:fld id="{3C8A4772-B952-DE4D-B887-74F2F545B670}" type="datetimeFigureOut">
               <a:rPr lang="en-US" smtClean="0"/>
-              <a:t>7/28/18</a:t>
+              <a:t>10/2/19</a:t>
             </a:fld>
             <a:endParaRPr lang="en-US"/>
           </a:p>
@@ -2051,7 +1968,7 @@
           <a:p>
             <a:fld id="{3C8A4772-B952-DE4D-B887-74F2F545B670}" type="datetimeFigureOut">
               <a:rPr lang="en-US" smtClean="0"/>
-              <a:t>7/28/18</a:t>
+              <a:t>10/2/19</a:t>
             </a:fld>
             <a:endParaRPr lang="en-US"/>
           </a:p>
@@ -2353,7 +2270,7 @@
           <a:p>
             <a:fld id="{3C8A4772-B952-DE4D-B887-74F2F545B670}" type="datetimeFigureOut">
               <a:rPr lang="en-US" smtClean="0"/>
-              <a:t>7/28/18</a:t>
+              <a:t>10/2/19</a:t>
             </a:fld>
             <a:endParaRPr lang="en-US"/>
           </a:p>
@@ -2775,7 +2692,7 @@
           <a:p>
             <a:fld id="{3C8A4772-B952-DE4D-B887-74F2F545B670}" type="datetimeFigureOut">
               <a:rPr lang="en-US" smtClean="0"/>
-              <a:t>7/28/18</a:t>
+              <a:t>10/2/19</a:t>
             </a:fld>
             <a:endParaRPr lang="en-US"/>
           </a:p>
@@ -2937,7 +2854,7 @@
           <a:p>
             <a:fld id="{3C8A4772-B952-DE4D-B887-74F2F545B670}" type="datetimeFigureOut">
               <a:rPr lang="en-US" smtClean="0"/>
-              <a:t>7/28/18</a:t>
+              <a:t>10/2/19</a:t>
             </a:fld>
             <a:endParaRPr lang="en-US"/>
           </a:p>
@@ -3032,7 +2949,7 @@
           <a:p>
             <a:fld id="{3C8A4772-B952-DE4D-B887-74F2F545B670}" type="datetimeFigureOut">
               <a:rPr lang="en-US" smtClean="0"/>
-              <a:t>7/28/18</a:t>
+              <a:t>10/2/19</a:t>
             </a:fld>
             <a:endParaRPr lang="en-US"/>
           </a:p>
@@ -3410,7 +3327,7 @@
           <a:p>
             <a:fld id="{3C8A4772-B952-DE4D-B887-74F2F545B670}" type="datetimeFigureOut">
               <a:rPr lang="en-US" smtClean="0"/>
-              <a:t>7/28/18</a:t>
+              <a:t>10/2/19</a:t>
             </a:fld>
             <a:endParaRPr lang="en-US"/>
           </a:p>
@@ -3699,7 +3616,7 @@
           <a:p>
             <a:fld id="{3C8A4772-B952-DE4D-B887-74F2F545B670}" type="datetimeFigureOut">
               <a:rPr lang="en-US" smtClean="0"/>
-              <a:t>7/28/18</a:t>
+              <a:t>10/2/19</a:t>
             </a:fld>
             <a:endParaRPr lang="en-US"/>
           </a:p>
@@ -3910,7 +3827,7 @@
           <a:p>
             <a:fld id="{3C8A4772-B952-DE4D-B887-74F2F545B670}" type="datetimeFigureOut">
               <a:rPr lang="en-US" smtClean="0"/>
-              <a:t>7/28/18</a:t>
+              <a:t>10/2/19</a:t>
             </a:fld>
             <a:endParaRPr lang="en-US"/>
           </a:p>
@@ -4574,6 +4491,38 @@
           </a:p>
         </p:txBody>
       </p:sp>
+      <p:sp>
+        <p:nvSpPr>
+          <p:cNvPr id="5" name="TextBox 4">
+            <a:extLst>
+              <a:ext uri="{FF2B5EF4-FFF2-40B4-BE49-F238E27FC236}">
+                <a16:creationId xmlns:a16="http://schemas.microsoft.com/office/drawing/2014/main" id="{0CFC3B20-B6CE-FC40-9553-59624E3E2B5E}"/>
+              </a:ext>
+            </a:extLst>
+          </p:cNvPr>
+          <p:cNvSpPr txBox="1"/>
+          <p:nvPr/>
+        </p:nvSpPr>
+        <p:spPr>
+          <a:xfrm>
+            <a:off x="2883159" y="4292082"/>
+            <a:ext cx="184731" cy="369332"/>
+          </a:xfrm>
+          <a:prstGeom prst="rect">
+            <a:avLst/>
+          </a:prstGeom>
+          <a:noFill/>
+        </p:spPr>
+        <p:txBody>
+          <a:bodyPr wrap="none" rtlCol="0">
+            <a:spAutoFit/>
+          </a:bodyPr>
+          <a:lstStyle/>
+          <a:p>
+            <a:endParaRPr lang="en-US" dirty="0"/>
+          </a:p>
+        </p:txBody>
+      </p:sp>
     </p:spTree>
     <p:extLst>
       <p:ext uri="{BB962C8B-B14F-4D97-AF65-F5344CB8AC3E}">
@@ -4609,7 +4558,7 @@
           <p:cNvPr id="2" name="Title 1">
             <a:extLst>
               <a:ext uri="{FF2B5EF4-FFF2-40B4-BE49-F238E27FC236}">
-                <a16:creationId xmlns:a16="http://schemas.microsoft.com/office/drawing/2014/main" id="{CD7685B5-E49D-FD4F-895A-09E8975FE9B7}"/>
+                <a16:creationId xmlns:a16="http://schemas.microsoft.com/office/drawing/2014/main" id="{48105764-B365-9246-AF58-F3DF2CBFCD01}"/>
               </a:ext>
             </a:extLst>
           </p:cNvPr>
@@ -4627,15 +4576,7 @@
           <a:p>
             <a:r>
               <a:rPr lang="en-US" dirty="0"/>
-              <a:t>Ingestion of Data – </a:t>
-            </a:r>
-            <a:r>
-              <a:rPr lang="en-US" dirty="0" err="1"/>
-              <a:t>Iot</a:t>
-            </a:r>
-            <a:r>
-              <a:rPr lang="en-US" dirty="0"/>
-              <a:t> Hub</a:t>
+              <a:t>Ingestion of Data – Custom API</a:t>
             </a:r>
           </a:p>
         </p:txBody>
@@ -4645,7 +4586,7 @@
           <p:cNvPr id="3" name="Content Placeholder 2">
             <a:extLst>
               <a:ext uri="{FF2B5EF4-FFF2-40B4-BE49-F238E27FC236}">
-                <a16:creationId xmlns:a16="http://schemas.microsoft.com/office/drawing/2014/main" id="{3CFE446B-8F08-004A-A09E-DAE1F19A6B3D}"/>
+                <a16:creationId xmlns:a16="http://schemas.microsoft.com/office/drawing/2014/main" id="{24FDF6E4-1DBE-AE40-9E47-37DC7B63F8C9}"/>
               </a:ext>
             </a:extLst>
           </p:cNvPr>
@@ -4663,31 +4604,25 @@
           <a:p>
             <a:r>
               <a:rPr lang="en-US" dirty="0"/>
-              <a:t>All Concerns addressed</a:t>
-            </a:r>
-          </a:p>
-          <a:p>
-            <a:r>
-              <a:rPr lang="en-US" dirty="0"/>
-              <a:t>Service not Code</a:t>
-            </a:r>
-          </a:p>
-          <a:p>
-            <a:r>
-              <a:rPr lang="en-US" dirty="0"/>
-              <a:t>Security – Device Registration Proactive vs Reactive</a:t>
-            </a:r>
-          </a:p>
-          <a:p>
-            <a:r>
-              <a:rPr lang="en-US" dirty="0"/>
-              <a:t>Ability to Send Messages to Device </a:t>
-            </a:r>
-          </a:p>
-          <a:p>
-            <a:r>
-              <a:rPr lang="en-US" dirty="0"/>
-              <a:t>Routing and Endpoints</a:t>
+              <a:t>All concerns could be handled</a:t>
+            </a:r>
+          </a:p>
+          <a:p>
+            <a:r>
+              <a:rPr lang="en-US" dirty="0"/>
+              <a:t>Newer and Better version of existing</a:t>
+            </a:r>
+          </a:p>
+          <a:p>
+            <a:r>
+              <a:rPr lang="en-US" dirty="0"/>
+              <a:t>Code and deployments for something that wasn’t doing much</a:t>
+            </a:r>
+          </a:p>
+          <a:p>
+            <a:r>
+              <a:rPr lang="en-US" dirty="0"/>
+              <a:t>Never truly considered</a:t>
             </a:r>
           </a:p>
         </p:txBody>
@@ -4695,7 +4630,7 @@
     </p:spTree>
     <p:extLst>
       <p:ext uri="{BB962C8B-B14F-4D97-AF65-F5344CB8AC3E}">
-        <p14:creationId xmlns:p14="http://schemas.microsoft.com/office/powerpoint/2010/main" val="149452348"/>
+        <p14:creationId xmlns:p14="http://schemas.microsoft.com/office/powerpoint/2010/main" val="3761287738"/>
       </p:ext>
     </p:extLst>
   </p:cSld>
@@ -4727,7 +4662,7 @@
           <p:cNvPr id="2" name="Title 1">
             <a:extLst>
               <a:ext uri="{FF2B5EF4-FFF2-40B4-BE49-F238E27FC236}">
-                <a16:creationId xmlns:a16="http://schemas.microsoft.com/office/drawing/2014/main" id="{8B85039A-8771-0B4F-91C5-7389D34851D7}"/>
+                <a16:creationId xmlns:a16="http://schemas.microsoft.com/office/drawing/2014/main" id="{C106B637-AF70-F847-BDA0-CC67479BED8D}"/>
               </a:ext>
             </a:extLst>
           </p:cNvPr>
@@ -4745,7 +4680,7 @@
           <a:p>
             <a:r>
               <a:rPr lang="en-US" dirty="0"/>
-              <a:t>Mobile Device changes</a:t>
+              <a:t>Ingestion of Data – Event Hub</a:t>
             </a:r>
           </a:p>
         </p:txBody>
@@ -4755,7 +4690,7 @@
           <p:cNvPr id="3" name="Content Placeholder 2">
             <a:extLst>
               <a:ext uri="{FF2B5EF4-FFF2-40B4-BE49-F238E27FC236}">
-                <a16:creationId xmlns:a16="http://schemas.microsoft.com/office/drawing/2014/main" id="{8D4A9DAB-E257-9241-B64A-7AA499D9B181}"/>
+                <a16:creationId xmlns:a16="http://schemas.microsoft.com/office/drawing/2014/main" id="{2182C7E6-F6FD-E54F-8D47-F427F2C947F2}"/>
               </a:ext>
             </a:extLst>
           </p:cNvPr>
@@ -4773,39 +4708,25 @@
           <a:p>
             <a:r>
               <a:rPr lang="en-US" dirty="0"/>
-              <a:t>Used existing Endpoint of API to handle Registration</a:t>
-            </a:r>
-          </a:p>
-          <a:p>
-            <a:r>
-              <a:rPr lang="en-US" dirty="0"/>
-              <a:t>Using Mobile Device for this, not the Black Box</a:t>
-            </a:r>
-          </a:p>
-          <a:p>
-            <a:r>
-              <a:rPr lang="en-US" dirty="0"/>
-              <a:t>New Endpoints and new Http Helpers</a:t>
-            </a:r>
-          </a:p>
-          <a:p>
-            <a:r>
-              <a:rPr lang="en-US" dirty="0"/>
-              <a:t>Wrap objects in </a:t>
-            </a:r>
-            <a:r>
-              <a:rPr lang="en-US" dirty="0" err="1"/>
-              <a:t>EventData</a:t>
-            </a:r>
-            <a:r>
-              <a:rPr lang="en-US" dirty="0"/>
-              <a:t> with Custom Properties</a:t>
-            </a:r>
-          </a:p>
-          <a:p>
-            <a:r>
-              <a:rPr lang="en-US" dirty="0"/>
-              <a:t>No Logic changes beyond feature Toggles</a:t>
+              <a:t>What is Designed for</a:t>
+            </a:r>
+          </a:p>
+          <a:p>
+            <a:r>
+              <a:rPr lang="en-US" dirty="0"/>
+              <a:t>Service not Code</a:t>
+            </a:r>
+          </a:p>
+          <a:p>
+            <a:r>
+              <a:rPr lang="en-US" dirty="0"/>
+              <a:t>Routing and Endpoints</a:t>
+            </a:r>
+          </a:p>
+          <a:p>
+            <a:r>
+              <a:rPr lang="en-US" dirty="0"/>
+              <a:t>Security – Custom work would have been needed</a:t>
             </a:r>
           </a:p>
         </p:txBody>
@@ -4813,7 +4734,7 @@
     </p:spTree>
     <p:extLst>
       <p:ext uri="{BB962C8B-B14F-4D97-AF65-F5344CB8AC3E}">
-        <p14:creationId xmlns:p14="http://schemas.microsoft.com/office/powerpoint/2010/main" val="310589040"/>
+        <p14:creationId xmlns:p14="http://schemas.microsoft.com/office/powerpoint/2010/main" val="710905023"/>
       </p:ext>
     </p:extLst>
   </p:cSld>
@@ -4845,7 +4766,7 @@
           <p:cNvPr id="2" name="Title 1">
             <a:extLst>
               <a:ext uri="{FF2B5EF4-FFF2-40B4-BE49-F238E27FC236}">
-                <a16:creationId xmlns:a16="http://schemas.microsoft.com/office/drawing/2014/main" id="{7A804B13-BB8C-7840-8051-0168D42CEE78}"/>
+                <a16:creationId xmlns:a16="http://schemas.microsoft.com/office/drawing/2014/main" id="{CD7685B5-E49D-FD4F-895A-09E8975FE9B7}"/>
               </a:ext>
             </a:extLst>
           </p:cNvPr>
@@ -4863,13 +4784,16 @@
           <a:p>
             <a:r>
               <a:rPr lang="en-US" dirty="0"/>
-              <a:t>Azure Functions to Process IoT </a:t>
+              <a:t>Ingestion of Data – </a:t>
             </a:r>
             <a:r>
               <a:rPr lang="en-US" dirty="0" err="1"/>
-              <a:t>HUb</a:t>
-            </a:r>
-            <a:endParaRPr lang="en-US" dirty="0"/>
+              <a:t>Iot</a:t>
+            </a:r>
+            <a:r>
+              <a:rPr lang="en-US" dirty="0"/>
+              <a:t> Hub</a:t>
+            </a:r>
           </a:p>
         </p:txBody>
       </p:sp>
@@ -4878,7 +4802,7 @@
           <p:cNvPr id="3" name="Content Placeholder 2">
             <a:extLst>
               <a:ext uri="{FF2B5EF4-FFF2-40B4-BE49-F238E27FC236}">
-                <a16:creationId xmlns:a16="http://schemas.microsoft.com/office/drawing/2014/main" id="{6FD58B42-DB12-8945-9878-AD804D5944EA}"/>
+                <a16:creationId xmlns:a16="http://schemas.microsoft.com/office/drawing/2014/main" id="{3CFE446B-8F08-004A-A09E-DAE1F19A6B3D}"/>
               </a:ext>
             </a:extLst>
           </p:cNvPr>
@@ -4896,36 +4820,39 @@
           <a:p>
             <a:r>
               <a:rPr lang="en-US" dirty="0"/>
-              <a:t>Running on Service Plan not Consumption</a:t>
-            </a:r>
-          </a:p>
-          <a:p>
-            <a:r>
-              <a:rPr lang="en-US" dirty="0"/>
-              <a:t>Bindings for Event Hub Endpoints</a:t>
-            </a:r>
-          </a:p>
-          <a:p>
-            <a:r>
-              <a:rPr lang="en-US" dirty="0"/>
-              <a:t>Consumer Groups</a:t>
-            </a:r>
-          </a:p>
-          <a:p>
-            <a:r>
-              <a:rPr lang="en-US" dirty="0"/>
-              <a:t>Batch Processing</a:t>
-            </a:r>
-          </a:p>
-          <a:p>
-            <a:endParaRPr lang="en-US" dirty="0"/>
+              <a:t>All Concerns addressed</a:t>
+            </a:r>
+          </a:p>
+          <a:p>
+            <a:r>
+              <a:rPr lang="en-US" dirty="0"/>
+              <a:t>Service not Code</a:t>
+            </a:r>
+          </a:p>
+          <a:p>
+            <a:r>
+              <a:rPr lang="en-US" dirty="0"/>
+              <a:t>Security – Device Registration Proactive vs Reactive</a:t>
+            </a:r>
+          </a:p>
+          <a:p>
+            <a:r>
+              <a:rPr lang="en-US" dirty="0"/>
+              <a:t>Routing and Endpoints</a:t>
+            </a:r>
+          </a:p>
+          <a:p>
+            <a:r>
+              <a:rPr lang="en-US" dirty="0"/>
+              <a:t>Bonus - Ability to Send Messages to Device </a:t>
+            </a:r>
           </a:p>
         </p:txBody>
       </p:sp>
     </p:spTree>
     <p:extLst>
       <p:ext uri="{BB962C8B-B14F-4D97-AF65-F5344CB8AC3E}">
-        <p14:creationId xmlns:p14="http://schemas.microsoft.com/office/powerpoint/2010/main" val="1478103995"/>
+        <p14:creationId xmlns:p14="http://schemas.microsoft.com/office/powerpoint/2010/main" val="149452348"/>
       </p:ext>
     </p:extLst>
   </p:cSld>
@@ -4957,7 +4884,7 @@
           <p:cNvPr id="2" name="Title 1">
             <a:extLst>
               <a:ext uri="{FF2B5EF4-FFF2-40B4-BE49-F238E27FC236}">
-                <a16:creationId xmlns:a16="http://schemas.microsoft.com/office/drawing/2014/main" id="{AE3D7BE8-51AB-0749-BDCA-AFDC7FEE3C76}"/>
+                <a16:creationId xmlns:a16="http://schemas.microsoft.com/office/drawing/2014/main" id="{8B85039A-8771-0B4F-91C5-7389D34851D7}"/>
               </a:ext>
             </a:extLst>
           </p:cNvPr>
@@ -4975,7 +4902,7 @@
           <a:p>
             <a:r>
               <a:rPr lang="en-US" dirty="0"/>
-              <a:t>Routing and Endpoints</a:t>
+              <a:t>Mobile Device changes</a:t>
             </a:r>
           </a:p>
         </p:txBody>
@@ -4985,7 +4912,7 @@
           <p:cNvPr id="3" name="Content Placeholder 2">
             <a:extLst>
               <a:ext uri="{FF2B5EF4-FFF2-40B4-BE49-F238E27FC236}">
-                <a16:creationId xmlns:a16="http://schemas.microsoft.com/office/drawing/2014/main" id="{23C0E4B7-B810-0342-AD8D-FCE592AC9E8A}"/>
+                <a16:creationId xmlns:a16="http://schemas.microsoft.com/office/drawing/2014/main" id="{8D4A9DAB-E257-9241-B64A-7AA499D9B181}"/>
               </a:ext>
             </a:extLst>
           </p:cNvPr>
@@ -5003,41 +4930,39 @@
           <a:p>
             <a:r>
               <a:rPr lang="en-US" dirty="0"/>
-              <a:t>Routes are a Filter on Meta Data – </a:t>
+              <a:t>Used existing Endpoint of API to handle Registration</a:t>
+            </a:r>
+          </a:p>
+          <a:p>
+            <a:r>
+              <a:rPr lang="en-US" dirty="0"/>
+              <a:t>Using Mobile Device for this, not the Black Box</a:t>
+            </a:r>
+          </a:p>
+          <a:p>
+            <a:r>
+              <a:rPr lang="en-US" dirty="0"/>
+              <a:t>New Endpoints and new Http Helpers</a:t>
+            </a:r>
+          </a:p>
+          <a:p>
+            <a:r>
+              <a:rPr lang="en-US" dirty="0"/>
+              <a:t>Wrap objects in </a:t>
             </a:r>
             <a:r>
               <a:rPr lang="en-US" dirty="0" err="1"/>
-              <a:t>messageType</a:t>
-            </a:r>
-            <a:r>
-              <a:rPr lang="en-US" dirty="0"/>
-              <a:t>=‘</a:t>
-            </a:r>
-            <a:r>
-              <a:rPr lang="en-US" dirty="0" err="1"/>
-              <a:t>eventdatarecords</a:t>
-            </a:r>
-            <a:r>
-              <a:rPr lang="en-US" dirty="0"/>
-              <a:t>’</a:t>
-            </a:r>
-          </a:p>
-          <a:p>
-            <a:r>
-              <a:rPr lang="en-US" dirty="0"/>
-              <a:t>Sent to a Specific Endpoint</a:t>
-            </a:r>
-          </a:p>
-          <a:p>
-            <a:r>
-              <a:rPr lang="en-US" dirty="0"/>
-              <a:t>Endpoints can then be used to Know what Data Type</a:t>
-            </a:r>
-          </a:p>
-          <a:p>
-            <a:r>
-              <a:rPr lang="en-US" dirty="0"/>
-              <a:t>Which Leads to…..</a:t>
+              <a:t>EventData</a:t>
+            </a:r>
+            <a:r>
+              <a:rPr lang="en-US" dirty="0"/>
+              <a:t> with Custom Properties</a:t>
+            </a:r>
+          </a:p>
+          <a:p>
+            <a:r>
+              <a:rPr lang="en-US" dirty="0"/>
+              <a:t>No Logic changes beyond feature Toggles</a:t>
             </a:r>
           </a:p>
         </p:txBody>
@@ -5045,7 +4970,7 @@
     </p:spTree>
     <p:extLst>
       <p:ext uri="{BB962C8B-B14F-4D97-AF65-F5344CB8AC3E}">
-        <p14:creationId xmlns:p14="http://schemas.microsoft.com/office/powerpoint/2010/main" val="3830478899"/>
+        <p14:creationId xmlns:p14="http://schemas.microsoft.com/office/powerpoint/2010/main" val="310589040"/>
       </p:ext>
     </p:extLst>
   </p:cSld>
@@ -5077,6 +5002,238 @@
           <p:cNvPr id="2" name="Title 1">
             <a:extLst>
               <a:ext uri="{FF2B5EF4-FFF2-40B4-BE49-F238E27FC236}">
+                <a16:creationId xmlns:a16="http://schemas.microsoft.com/office/drawing/2014/main" id="{7A804B13-BB8C-7840-8051-0168D42CEE78}"/>
+              </a:ext>
+            </a:extLst>
+          </p:cNvPr>
+          <p:cNvSpPr>
+            <a:spLocks noGrp="1"/>
+          </p:cNvSpPr>
+          <p:nvPr>
+            <p:ph type="title"/>
+          </p:nvPr>
+        </p:nvSpPr>
+        <p:spPr/>
+        <p:txBody>
+          <a:bodyPr/>
+          <a:lstStyle/>
+          <a:p>
+            <a:r>
+              <a:rPr lang="en-US" dirty="0"/>
+              <a:t>Azure Functions to Process IoT </a:t>
+            </a:r>
+            <a:r>
+              <a:rPr lang="en-US" dirty="0" err="1"/>
+              <a:t>HUb</a:t>
+            </a:r>
+            <a:endParaRPr lang="en-US" dirty="0"/>
+          </a:p>
+        </p:txBody>
+      </p:sp>
+      <p:sp>
+        <p:nvSpPr>
+          <p:cNvPr id="3" name="Content Placeholder 2">
+            <a:extLst>
+              <a:ext uri="{FF2B5EF4-FFF2-40B4-BE49-F238E27FC236}">
+                <a16:creationId xmlns:a16="http://schemas.microsoft.com/office/drawing/2014/main" id="{6FD58B42-DB12-8945-9878-AD804D5944EA}"/>
+              </a:ext>
+            </a:extLst>
+          </p:cNvPr>
+          <p:cNvSpPr>
+            <a:spLocks noGrp="1"/>
+          </p:cNvSpPr>
+          <p:nvPr>
+            <p:ph idx="1"/>
+          </p:nvPr>
+        </p:nvSpPr>
+        <p:spPr/>
+        <p:txBody>
+          <a:bodyPr/>
+          <a:lstStyle/>
+          <a:p>
+            <a:r>
+              <a:rPr lang="en-US" dirty="0"/>
+              <a:t>Running on Service Plan not Consumption</a:t>
+            </a:r>
+          </a:p>
+          <a:p>
+            <a:r>
+              <a:rPr lang="en-US" dirty="0"/>
+              <a:t>Bindings for Event Hub Endpoints</a:t>
+            </a:r>
+          </a:p>
+          <a:p>
+            <a:r>
+              <a:rPr lang="en-US" dirty="0"/>
+              <a:t>Consumer Groups</a:t>
+            </a:r>
+          </a:p>
+          <a:p>
+            <a:r>
+              <a:rPr lang="en-US" dirty="0"/>
+              <a:t>Batch Processing</a:t>
+            </a:r>
+          </a:p>
+          <a:p>
+            <a:endParaRPr lang="en-US" dirty="0"/>
+          </a:p>
+        </p:txBody>
+      </p:sp>
+    </p:spTree>
+    <p:extLst>
+      <p:ext uri="{BB962C8B-B14F-4D97-AF65-F5344CB8AC3E}">
+        <p14:creationId xmlns:p14="http://schemas.microsoft.com/office/powerpoint/2010/main" val="1478103995"/>
+      </p:ext>
+    </p:extLst>
+  </p:cSld>
+  <p:clrMapOvr>
+    <a:masterClrMapping/>
+  </p:clrMapOvr>
+</p:sld>
+</file>
+
+<file path=ppt/slides/slide15.xml><?xml version="1.0" encoding="utf-8"?>
+<p:sld xmlns:a="http://schemas.openxmlformats.org/drawingml/2006/main" xmlns:r="http://schemas.openxmlformats.org/officeDocument/2006/relationships" xmlns:p="http://schemas.openxmlformats.org/presentationml/2006/main">
+  <p:cSld>
+    <p:spTree>
+      <p:nvGrpSpPr>
+        <p:cNvPr id="1" name=""/>
+        <p:cNvGrpSpPr/>
+        <p:nvPr/>
+      </p:nvGrpSpPr>
+      <p:grpSpPr>
+        <a:xfrm>
+          <a:off x="0" y="0"/>
+          <a:ext cx="0" cy="0"/>
+          <a:chOff x="0" y="0"/>
+          <a:chExt cx="0" cy="0"/>
+        </a:xfrm>
+      </p:grpSpPr>
+      <p:sp>
+        <p:nvSpPr>
+          <p:cNvPr id="2" name="Title 1">
+            <a:extLst>
+              <a:ext uri="{FF2B5EF4-FFF2-40B4-BE49-F238E27FC236}">
+                <a16:creationId xmlns:a16="http://schemas.microsoft.com/office/drawing/2014/main" id="{AE3D7BE8-51AB-0749-BDCA-AFDC7FEE3C76}"/>
+              </a:ext>
+            </a:extLst>
+          </p:cNvPr>
+          <p:cNvSpPr>
+            <a:spLocks noGrp="1"/>
+          </p:cNvSpPr>
+          <p:nvPr>
+            <p:ph type="title"/>
+          </p:nvPr>
+        </p:nvSpPr>
+        <p:spPr/>
+        <p:txBody>
+          <a:bodyPr/>
+          <a:lstStyle/>
+          <a:p>
+            <a:r>
+              <a:rPr lang="en-US" dirty="0"/>
+              <a:t>Routing and Endpoints</a:t>
+            </a:r>
+          </a:p>
+        </p:txBody>
+      </p:sp>
+      <p:sp>
+        <p:nvSpPr>
+          <p:cNvPr id="3" name="Content Placeholder 2">
+            <a:extLst>
+              <a:ext uri="{FF2B5EF4-FFF2-40B4-BE49-F238E27FC236}">
+                <a16:creationId xmlns:a16="http://schemas.microsoft.com/office/drawing/2014/main" id="{23C0E4B7-B810-0342-AD8D-FCE592AC9E8A}"/>
+              </a:ext>
+            </a:extLst>
+          </p:cNvPr>
+          <p:cNvSpPr>
+            <a:spLocks noGrp="1"/>
+          </p:cNvSpPr>
+          <p:nvPr>
+            <p:ph idx="1"/>
+          </p:nvPr>
+        </p:nvSpPr>
+        <p:spPr/>
+        <p:txBody>
+          <a:bodyPr/>
+          <a:lstStyle/>
+          <a:p>
+            <a:r>
+              <a:rPr lang="en-US" dirty="0"/>
+              <a:t>Routes are a Filter on Meta Data – </a:t>
+            </a:r>
+            <a:r>
+              <a:rPr lang="en-US" dirty="0" err="1"/>
+              <a:t>messageType</a:t>
+            </a:r>
+            <a:r>
+              <a:rPr lang="en-US" dirty="0"/>
+              <a:t>=‘</a:t>
+            </a:r>
+            <a:r>
+              <a:rPr lang="en-US" dirty="0" err="1"/>
+              <a:t>eventdatarecords</a:t>
+            </a:r>
+            <a:r>
+              <a:rPr lang="en-US" dirty="0"/>
+              <a:t>’</a:t>
+            </a:r>
+          </a:p>
+          <a:p>
+            <a:r>
+              <a:rPr lang="en-US" dirty="0"/>
+              <a:t>Sent to a Specific Endpoint</a:t>
+            </a:r>
+          </a:p>
+          <a:p>
+            <a:r>
+              <a:rPr lang="en-US" dirty="0"/>
+              <a:t>Endpoints can then be used to Know what Data Type</a:t>
+            </a:r>
+          </a:p>
+          <a:p>
+            <a:r>
+              <a:rPr lang="en-US" dirty="0"/>
+              <a:t>Which Leads to…..</a:t>
+            </a:r>
+          </a:p>
+        </p:txBody>
+      </p:sp>
+    </p:spTree>
+    <p:extLst>
+      <p:ext uri="{BB962C8B-B14F-4D97-AF65-F5344CB8AC3E}">
+        <p14:creationId xmlns:p14="http://schemas.microsoft.com/office/powerpoint/2010/main" val="3830478899"/>
+      </p:ext>
+    </p:extLst>
+  </p:cSld>
+  <p:clrMapOvr>
+    <a:masterClrMapping/>
+  </p:clrMapOvr>
+</p:sld>
+</file>
+
+<file path=ppt/slides/slide16.xml><?xml version="1.0" encoding="utf-8"?>
+<p:sld xmlns:a="http://schemas.openxmlformats.org/drawingml/2006/main" xmlns:r="http://schemas.openxmlformats.org/officeDocument/2006/relationships" xmlns:p="http://schemas.openxmlformats.org/presentationml/2006/main">
+  <p:cSld>
+    <p:spTree>
+      <p:nvGrpSpPr>
+        <p:cNvPr id="1" name=""/>
+        <p:cNvGrpSpPr/>
+        <p:nvPr/>
+      </p:nvGrpSpPr>
+      <p:grpSpPr>
+        <a:xfrm>
+          <a:off x="0" y="0"/>
+          <a:ext cx="0" cy="0"/>
+          <a:chOff x="0" y="0"/>
+          <a:chExt cx="0" cy="0"/>
+        </a:xfrm>
+      </p:grpSpPr>
+      <p:sp>
+        <p:nvSpPr>
+          <p:cNvPr id="2" name="Title 1">
+            <a:extLst>
+              <a:ext uri="{FF2B5EF4-FFF2-40B4-BE49-F238E27FC236}">
                 <a16:creationId xmlns:a16="http://schemas.microsoft.com/office/drawing/2014/main" id="{CFF26A96-6FFD-6148-B77A-8812A6DBD934}"/>
               </a:ext>
             </a:extLst>
@@ -5156,7 +5313,7 @@
 </p:sld>
 </file>
 
-<file path=ppt/slides/slide15.xml><?xml version="1.0" encoding="utf-8"?>
+<file path=ppt/slides/slide17.xml><?xml version="1.0" encoding="utf-8"?>
 <p:sld xmlns:a="http://schemas.openxmlformats.org/drawingml/2006/main" xmlns:r="http://schemas.openxmlformats.org/officeDocument/2006/relationships" xmlns:p="http://schemas.openxmlformats.org/presentationml/2006/main">
   <p:cSld>
     <p:spTree>
@@ -5273,7 +5430,7 @@
 </p:sld>
 </file>
 
-<file path=ppt/slides/slide16.xml><?xml version="1.0" encoding="utf-8"?>
+<file path=ppt/slides/slide18.xml><?xml version="1.0" encoding="utf-8"?>
 <p:sld xmlns:a="http://schemas.openxmlformats.org/drawingml/2006/main" xmlns:r="http://schemas.openxmlformats.org/officeDocument/2006/relationships" xmlns:p="http://schemas.openxmlformats.org/presentationml/2006/main">
   <p:cSld>
     <p:spTree>
@@ -5360,223 +5517,6 @@
 </p:sld>
 </file>
 
-<file path=ppt/slides/slide17.xml><?xml version="1.0" encoding="utf-8"?>
-<p:sld xmlns:a="http://schemas.openxmlformats.org/drawingml/2006/main" xmlns:r="http://schemas.openxmlformats.org/officeDocument/2006/relationships" xmlns:p="http://schemas.openxmlformats.org/presentationml/2006/main">
-  <p:cSld>
-    <p:spTree>
-      <p:nvGrpSpPr>
-        <p:cNvPr id="1" name=""/>
-        <p:cNvGrpSpPr/>
-        <p:nvPr/>
-      </p:nvGrpSpPr>
-      <p:grpSpPr>
-        <a:xfrm>
-          <a:off x="0" y="0"/>
-          <a:ext cx="0" cy="0"/>
-          <a:chOff x="0" y="0"/>
-          <a:chExt cx="0" cy="0"/>
-        </a:xfrm>
-      </p:grpSpPr>
-      <p:sp>
-        <p:nvSpPr>
-          <p:cNvPr id="2" name="Title 1">
-            <a:extLst>
-              <a:ext uri="{FF2B5EF4-FFF2-40B4-BE49-F238E27FC236}">
-                <a16:creationId xmlns:a16="http://schemas.microsoft.com/office/drawing/2014/main" id="{2C90AB7C-F4D0-BE45-AF20-0FCAE080F108}"/>
-              </a:ext>
-            </a:extLst>
-          </p:cNvPr>
-          <p:cNvSpPr>
-            <a:spLocks noGrp="1"/>
-          </p:cNvSpPr>
-          <p:nvPr>
-            <p:ph type="title"/>
-          </p:nvPr>
-        </p:nvSpPr>
-        <p:spPr/>
-        <p:txBody>
-          <a:bodyPr/>
-          <a:lstStyle/>
-          <a:p>
-            <a:r>
-              <a:rPr lang="en-US" dirty="0"/>
-              <a:t>Azure Function Work</a:t>
-            </a:r>
-          </a:p>
-        </p:txBody>
-      </p:sp>
-      <p:sp>
-        <p:nvSpPr>
-          <p:cNvPr id="3" name="Content Placeholder 2">
-            <a:extLst>
-              <a:ext uri="{FF2B5EF4-FFF2-40B4-BE49-F238E27FC236}">
-                <a16:creationId xmlns:a16="http://schemas.microsoft.com/office/drawing/2014/main" id="{4E5088C6-D062-0243-90DC-CC4CE33B4C4D}"/>
-              </a:ext>
-            </a:extLst>
-          </p:cNvPr>
-          <p:cNvSpPr>
-            <a:spLocks noGrp="1"/>
-          </p:cNvSpPr>
-          <p:nvPr>
-            <p:ph idx="1"/>
-          </p:nvPr>
-        </p:nvSpPr>
-        <p:spPr/>
-        <p:txBody>
-          <a:bodyPr/>
-          <a:lstStyle/>
-          <a:p>
-            <a:r>
-              <a:rPr lang="en-US" dirty="0"/>
-              <a:t>Mapping of Data</a:t>
-            </a:r>
-          </a:p>
-          <a:p>
-            <a:r>
-              <a:rPr lang="en-US" dirty="0"/>
-              <a:t>Simple Lookups from API or Cache using </a:t>
-            </a:r>
-            <a:r>
-              <a:rPr lang="en-US" dirty="0" err="1"/>
-              <a:t>Redis</a:t>
-            </a:r>
-            <a:endParaRPr lang="en-US" dirty="0"/>
-          </a:p>
-          <a:p>
-            <a:r>
-              <a:rPr lang="en-US" dirty="0"/>
-              <a:t>Save to Storage</a:t>
-            </a:r>
-          </a:p>
-          <a:p>
-            <a:r>
-              <a:rPr lang="en-US" dirty="0"/>
-              <a:t>Publish to Service Bus (With Deduplication)</a:t>
-            </a:r>
-          </a:p>
-        </p:txBody>
-      </p:sp>
-    </p:spTree>
-    <p:extLst>
-      <p:ext uri="{BB962C8B-B14F-4D97-AF65-F5344CB8AC3E}">
-        <p14:creationId xmlns:p14="http://schemas.microsoft.com/office/powerpoint/2010/main" val="1627302869"/>
-      </p:ext>
-    </p:extLst>
-  </p:cSld>
-  <p:clrMapOvr>
-    <a:masterClrMapping/>
-  </p:clrMapOvr>
-</p:sld>
-</file>
-
-<file path=ppt/slides/slide18.xml><?xml version="1.0" encoding="utf-8"?>
-<p:sld xmlns:a="http://schemas.openxmlformats.org/drawingml/2006/main" xmlns:r="http://schemas.openxmlformats.org/officeDocument/2006/relationships" xmlns:p="http://schemas.openxmlformats.org/presentationml/2006/main">
-  <p:cSld>
-    <p:spTree>
-      <p:nvGrpSpPr>
-        <p:cNvPr id="1" name=""/>
-        <p:cNvGrpSpPr/>
-        <p:nvPr/>
-      </p:nvGrpSpPr>
-      <p:grpSpPr>
-        <a:xfrm>
-          <a:off x="0" y="0"/>
-          <a:ext cx="0" cy="0"/>
-          <a:chOff x="0" y="0"/>
-          <a:chExt cx="0" cy="0"/>
-        </a:xfrm>
-      </p:grpSpPr>
-      <p:sp>
-        <p:nvSpPr>
-          <p:cNvPr id="2" name="Title 1">
-            <a:extLst>
-              <a:ext uri="{FF2B5EF4-FFF2-40B4-BE49-F238E27FC236}">
-                <a16:creationId xmlns:a16="http://schemas.microsoft.com/office/drawing/2014/main" id="{79BEEFD3-A25D-9644-BFE4-784BA6F2AE61}"/>
-              </a:ext>
-            </a:extLst>
-          </p:cNvPr>
-          <p:cNvSpPr>
-            <a:spLocks noGrp="1"/>
-          </p:cNvSpPr>
-          <p:nvPr>
-            <p:ph type="title"/>
-          </p:nvPr>
-        </p:nvSpPr>
-        <p:spPr/>
-        <p:txBody>
-          <a:bodyPr/>
-          <a:lstStyle/>
-          <a:p>
-            <a:r>
-              <a:rPr lang="en-US" dirty="0" err="1"/>
-              <a:t>Redis</a:t>
-            </a:r>
-            <a:r>
-              <a:rPr lang="en-US" dirty="0"/>
-              <a:t> Caching</a:t>
-            </a:r>
-          </a:p>
-        </p:txBody>
-      </p:sp>
-      <p:sp>
-        <p:nvSpPr>
-          <p:cNvPr id="3" name="Content Placeholder 2">
-            <a:extLst>
-              <a:ext uri="{FF2B5EF4-FFF2-40B4-BE49-F238E27FC236}">
-                <a16:creationId xmlns:a16="http://schemas.microsoft.com/office/drawing/2014/main" id="{F9985B8D-8563-9548-96F9-4EFD56EA1FA5}"/>
-              </a:ext>
-            </a:extLst>
-          </p:cNvPr>
-          <p:cNvSpPr>
-            <a:spLocks noGrp="1"/>
-          </p:cNvSpPr>
-          <p:nvPr>
-            <p:ph idx="1"/>
-          </p:nvPr>
-        </p:nvSpPr>
-        <p:spPr/>
-        <p:txBody>
-          <a:bodyPr/>
-          <a:lstStyle/>
-          <a:p>
-            <a:r>
-              <a:rPr lang="en-US" dirty="0"/>
-              <a:t>Same Devices Submitting All Day</a:t>
-            </a:r>
-          </a:p>
-          <a:p>
-            <a:r>
-              <a:rPr lang="en-US" dirty="0"/>
-              <a:t>Prevents Unnecessary Calls to API</a:t>
-            </a:r>
-          </a:p>
-          <a:p>
-            <a:r>
-              <a:rPr lang="en-US" dirty="0"/>
-              <a:t>Used across all Ingestion Routes</a:t>
-            </a:r>
-          </a:p>
-          <a:p>
-            <a:r>
-              <a:rPr lang="en-US" dirty="0"/>
-              <a:t>Used for Deduplication – Service Bus deduplication didn’t work for us.</a:t>
-            </a:r>
-          </a:p>
-        </p:txBody>
-      </p:sp>
-    </p:spTree>
-    <p:extLst>
-      <p:ext uri="{BB962C8B-B14F-4D97-AF65-F5344CB8AC3E}">
-        <p14:creationId xmlns:p14="http://schemas.microsoft.com/office/powerpoint/2010/main" val="3236457567"/>
-      </p:ext>
-    </p:extLst>
-  </p:cSld>
-  <p:clrMapOvr>
-    <a:masterClrMapping/>
-  </p:clrMapOvr>
-</p:sld>
-</file>
-
 <file path=ppt/slides/slide19.xml><?xml version="1.0" encoding="utf-8"?>
 <p:sld xmlns:a="http://schemas.openxmlformats.org/drawingml/2006/main" xmlns:r="http://schemas.openxmlformats.org/officeDocument/2006/relationships" xmlns:p="http://schemas.openxmlformats.org/presentationml/2006/main">
   <p:cSld>
@@ -5599,7 +5539,7 @@
           <p:cNvPr id="2" name="Title 1">
             <a:extLst>
               <a:ext uri="{FF2B5EF4-FFF2-40B4-BE49-F238E27FC236}">
-                <a16:creationId xmlns:a16="http://schemas.microsoft.com/office/drawing/2014/main" id="{8E9440F8-969D-3049-9636-2389443877FF}"/>
+                <a16:creationId xmlns:a16="http://schemas.microsoft.com/office/drawing/2014/main" id="{2C90AB7C-F4D0-BE45-AF20-0FCAE080F108}"/>
               </a:ext>
             </a:extLst>
           </p:cNvPr>
@@ -5617,7 +5557,7 @@
           <a:p>
             <a:r>
               <a:rPr lang="en-US" dirty="0"/>
-              <a:t>Data Lake, Streaming Analytics, and Data Factory</a:t>
+              <a:t>Azure Function Work</a:t>
             </a:r>
           </a:p>
         </p:txBody>
@@ -5627,7 +5567,7 @@
           <p:cNvPr id="3" name="Content Placeholder 2">
             <a:extLst>
               <a:ext uri="{FF2B5EF4-FFF2-40B4-BE49-F238E27FC236}">
-                <a16:creationId xmlns:a16="http://schemas.microsoft.com/office/drawing/2014/main" id="{E61F918A-B8B5-2C43-85BC-35AF9F5A822E}"/>
+                <a16:creationId xmlns:a16="http://schemas.microsoft.com/office/drawing/2014/main" id="{4E5088C6-D062-0243-90DC-CC4CE33B4C4D}"/>
               </a:ext>
             </a:extLst>
           </p:cNvPr>
@@ -5645,36 +5585,38 @@
           <a:p>
             <a:r>
               <a:rPr lang="en-US" dirty="0"/>
-              <a:t>Started Here</a:t>
-            </a:r>
-          </a:p>
-          <a:p>
-            <a:r>
-              <a:rPr lang="en-US" dirty="0"/>
-              <a:t>Felt Too Much like SSIS and Dump and Figure out Later</a:t>
-            </a:r>
-          </a:p>
-          <a:p>
-            <a:r>
-              <a:rPr lang="en-US" dirty="0"/>
-              <a:t>Not Running Real Time</a:t>
-            </a:r>
-          </a:p>
-          <a:p>
-            <a:r>
-              <a:rPr lang="en-US" dirty="0"/>
-              <a:t>Long Term vs Processing</a:t>
-            </a:r>
-          </a:p>
-          <a:p>
+              <a:t>Mapping of Data</a:t>
+            </a:r>
+          </a:p>
+          <a:p>
+            <a:r>
+              <a:rPr lang="en-US" dirty="0"/>
+              <a:t>Simple Lookups from API or Cache using </a:t>
+            </a:r>
+            <a:r>
+              <a:rPr lang="en-US" dirty="0" err="1"/>
+              <a:t>Redis</a:t>
+            </a:r>
             <a:endParaRPr lang="en-US" dirty="0"/>
+          </a:p>
+          <a:p>
+            <a:r>
+              <a:rPr lang="en-US" dirty="0"/>
+              <a:t>Save to Storage</a:t>
+            </a:r>
+          </a:p>
+          <a:p>
+            <a:r>
+              <a:rPr lang="en-US" dirty="0"/>
+              <a:t>Publish to Service Bus (With Deduplication)</a:t>
+            </a:r>
           </a:p>
         </p:txBody>
       </p:sp>
     </p:spTree>
     <p:extLst>
       <p:ext uri="{BB962C8B-B14F-4D97-AF65-F5344CB8AC3E}">
-        <p14:creationId xmlns:p14="http://schemas.microsoft.com/office/powerpoint/2010/main" val="3292344427"/>
+        <p14:creationId xmlns:p14="http://schemas.microsoft.com/office/powerpoint/2010/main" val="1627302869"/>
       </p:ext>
     </p:extLst>
   </p:cSld>
@@ -5701,109 +5643,40 @@
           <a:chExt cx="0" cy="0"/>
         </a:xfrm>
       </p:grpSpPr>
-      <p:sp>
-        <p:nvSpPr>
-          <p:cNvPr id="2" name="Title 1">
+      <p:pic>
+        <p:nvPicPr>
+          <p:cNvPr id="3" name="Picture 2">
             <a:extLst>
               <a:ext uri="{FF2B5EF4-FFF2-40B4-BE49-F238E27FC236}">
-                <a16:creationId xmlns:a16="http://schemas.microsoft.com/office/drawing/2014/main" id="{F047B8CF-0916-8147-B668-444D16F0462D}"/>
+                <a16:creationId xmlns:a16="http://schemas.microsoft.com/office/drawing/2014/main" id="{5EF378D0-3A02-0C49-B1D8-6728146622BA}"/>
               </a:ext>
             </a:extLst>
           </p:cNvPr>
-          <p:cNvSpPr>
-            <a:spLocks noGrp="1"/>
-          </p:cNvSpPr>
-          <p:nvPr>
-            <p:ph type="title"/>
-          </p:nvPr>
-        </p:nvSpPr>
-        <p:spPr/>
-        <p:txBody>
-          <a:bodyPr/>
-          <a:lstStyle/>
-          <a:p>
-            <a:pPr algn="ctr"/>
-            <a:r>
-              <a:rPr lang="en-US" dirty="0"/>
-              <a:t>Allen Zaudtke</a:t>
-            </a:r>
-          </a:p>
-        </p:txBody>
-      </p:sp>
-      <p:sp>
-        <p:nvSpPr>
-          <p:cNvPr id="3" name="Content Placeholder 2">
-            <a:extLst>
-              <a:ext uri="{FF2B5EF4-FFF2-40B4-BE49-F238E27FC236}">
-                <a16:creationId xmlns:a16="http://schemas.microsoft.com/office/drawing/2014/main" id="{78E81EC8-ED81-2544-8F9C-88C61B272CC6}"/>
-              </a:ext>
-            </a:extLst>
-          </p:cNvPr>
-          <p:cNvSpPr>
-            <a:spLocks noGrp="1"/>
-          </p:cNvSpPr>
-          <p:nvPr>
-            <p:ph idx="1"/>
-          </p:nvPr>
-        </p:nvSpPr>
-        <p:spPr/>
-        <p:txBody>
-          <a:bodyPr/>
-          <a:lstStyle/>
-          <a:p>
-            <a:r>
-              <a:rPr lang="en-US" dirty="0"/>
-              <a:t>Architect at J. J. Keller &amp; Associates, Inc.</a:t>
-            </a:r>
-          </a:p>
-          <a:p>
-            <a:r>
-              <a:rPr lang="en-US" dirty="0"/>
-              <a:t>Web and Cloud Applications</a:t>
-            </a:r>
-          </a:p>
-          <a:p>
-            <a:r>
-              <a:rPr lang="en-US" dirty="0"/>
-              <a:t>@</a:t>
-            </a:r>
-            <a:r>
-              <a:rPr lang="en-US" dirty="0" err="1"/>
-              <a:t>alzaudtke</a:t>
-            </a:r>
-            <a:endParaRPr lang="en-US" dirty="0"/>
-          </a:p>
-          <a:p>
-            <a:r>
-              <a:rPr lang="en-US" dirty="0"/>
-              <a:t>https://</a:t>
-            </a:r>
-            <a:r>
-              <a:rPr lang="en-US" dirty="0" err="1"/>
-              <a:t>github.com</a:t>
-            </a:r>
-            <a:r>
-              <a:rPr lang="en-US" dirty="0"/>
-              <a:t>/</a:t>
-            </a:r>
-            <a:r>
-              <a:rPr lang="en-US" dirty="0" err="1"/>
-              <a:t>zaudtke</a:t>
-            </a:r>
-            <a:endParaRPr lang="en-US" dirty="0"/>
-          </a:p>
-          <a:p>
-            <a:endParaRPr lang="en-US" dirty="0"/>
-          </a:p>
-          <a:p>
-            <a:endParaRPr lang="en-US" dirty="0"/>
-          </a:p>
-        </p:txBody>
-      </p:sp>
+          <p:cNvPicPr>
+            <a:picLocks noChangeAspect="1"/>
+          </p:cNvPicPr>
+          <p:nvPr/>
+        </p:nvPicPr>
+        <p:blipFill>
+          <a:blip r:embed="rId2"/>
+          <a:stretch>
+            <a:fillRect/>
+          </a:stretch>
+        </p:blipFill>
+        <p:spPr>
+          <a:xfrm>
+            <a:off x="0" y="0"/>
+            <a:ext cx="12192000" cy="6858000"/>
+          </a:xfrm>
+          <a:prstGeom prst="rect">
+            <a:avLst/>
+          </a:prstGeom>
+        </p:spPr>
+      </p:pic>
     </p:spTree>
     <p:extLst>
       <p:ext uri="{BB962C8B-B14F-4D97-AF65-F5344CB8AC3E}">
-        <p14:creationId xmlns:p14="http://schemas.microsoft.com/office/powerpoint/2010/main" val="3572810702"/>
+        <p14:creationId xmlns:p14="http://schemas.microsoft.com/office/powerpoint/2010/main" val="352372430"/>
       </p:ext>
     </p:extLst>
   </p:cSld>
@@ -5835,7 +5708,7 @@
           <p:cNvPr id="2" name="Title 1">
             <a:extLst>
               <a:ext uri="{FF2B5EF4-FFF2-40B4-BE49-F238E27FC236}">
-                <a16:creationId xmlns:a16="http://schemas.microsoft.com/office/drawing/2014/main" id="{C45B49D9-E096-9141-9721-1843D4B0881A}"/>
+                <a16:creationId xmlns:a16="http://schemas.microsoft.com/office/drawing/2014/main" id="{79BEEFD3-A25D-9644-BFE4-784BA6F2AE61}"/>
               </a:ext>
             </a:extLst>
           </p:cNvPr>
@@ -5852,8 +5725,12 @@
           <a:lstStyle/>
           <a:p>
             <a:r>
-              <a:rPr lang="en-US" dirty="0"/>
-              <a:t>Table Storage – The Good</a:t>
+              <a:rPr lang="en-US" dirty="0" err="1"/>
+              <a:t>Redis</a:t>
+            </a:r>
+            <a:r>
+              <a:rPr lang="en-US" dirty="0"/>
+              <a:t> Caching</a:t>
             </a:r>
           </a:p>
         </p:txBody>
@@ -5863,7 +5740,7 @@
           <p:cNvPr id="3" name="Content Placeholder 2">
             <a:extLst>
               <a:ext uri="{FF2B5EF4-FFF2-40B4-BE49-F238E27FC236}">
-                <a16:creationId xmlns:a16="http://schemas.microsoft.com/office/drawing/2014/main" id="{3C55FC4B-E29F-5644-856D-BBD9E1030EFB}"/>
+                <a16:creationId xmlns:a16="http://schemas.microsoft.com/office/drawing/2014/main" id="{F9985B8D-8563-9548-96F9-4EFD56EA1FA5}"/>
               </a:ext>
             </a:extLst>
           </p:cNvPr>
@@ -5881,19 +5758,25 @@
           <a:p>
             <a:r>
               <a:rPr lang="en-US" dirty="0"/>
-              <a:t>Had Natural Row and Partition Keys</a:t>
-            </a:r>
-          </a:p>
-          <a:p>
-            <a:r>
-              <a:rPr lang="en-US" dirty="0"/>
-              <a:t>Cheap and Easy</a:t>
-            </a:r>
-          </a:p>
-          <a:p>
-            <a:r>
-              <a:rPr lang="en-US" dirty="0"/>
-              <a:t>Made Sense for the first Process</a:t>
+              <a:t>Same Devices Submitting All Day</a:t>
+            </a:r>
+          </a:p>
+          <a:p>
+            <a:r>
+              <a:rPr lang="en-US" dirty="0"/>
+              <a:t>Prevents Unnecessary Calls to API</a:t>
+            </a:r>
+          </a:p>
+          <a:p>
+            <a:r>
+              <a:rPr lang="en-US" dirty="0"/>
+              <a:t>Used across all Ingestion Routes</a:t>
+            </a:r>
+          </a:p>
+          <a:p>
+            <a:r>
+              <a:rPr lang="en-US" dirty="0"/>
+              <a:t>Used for Deduplication – Service Bus deduplication didn’t work for us.</a:t>
             </a:r>
           </a:p>
         </p:txBody>
@@ -5901,7 +5784,7 @@
     </p:spTree>
     <p:extLst>
       <p:ext uri="{BB962C8B-B14F-4D97-AF65-F5344CB8AC3E}">
-        <p14:creationId xmlns:p14="http://schemas.microsoft.com/office/powerpoint/2010/main" val="2991144793"/>
+        <p14:creationId xmlns:p14="http://schemas.microsoft.com/office/powerpoint/2010/main" val="3236457567"/>
       </p:ext>
     </p:extLst>
   </p:cSld>
@@ -5933,7 +5816,7 @@
           <p:cNvPr id="2" name="Title 1">
             <a:extLst>
               <a:ext uri="{FF2B5EF4-FFF2-40B4-BE49-F238E27FC236}">
-                <a16:creationId xmlns:a16="http://schemas.microsoft.com/office/drawing/2014/main" id="{EB71402D-A8F6-514F-A089-594A0DF6836C}"/>
+                <a16:creationId xmlns:a16="http://schemas.microsoft.com/office/drawing/2014/main" id="{8E9440F8-969D-3049-9636-2389443877FF}"/>
               </a:ext>
             </a:extLst>
           </p:cNvPr>
@@ -5951,7 +5834,7 @@
           <a:p>
             <a:r>
               <a:rPr lang="en-US" dirty="0"/>
-              <a:t>Table Storage – Not as Good</a:t>
+              <a:t>Data Lake, Streaming Analytics, and Data Factory</a:t>
             </a:r>
           </a:p>
         </p:txBody>
@@ -5961,7 +5844,7 @@
           <p:cNvPr id="3" name="Content Placeholder 2">
             <a:extLst>
               <a:ext uri="{FF2B5EF4-FFF2-40B4-BE49-F238E27FC236}">
-                <a16:creationId xmlns:a16="http://schemas.microsoft.com/office/drawing/2014/main" id="{9E9A9433-6475-BB49-8A4C-B885B1400E53}"/>
+                <a16:creationId xmlns:a16="http://schemas.microsoft.com/office/drawing/2014/main" id="{E61F918A-B8B5-2C43-85BC-35AF9F5A822E}"/>
               </a:ext>
             </a:extLst>
           </p:cNvPr>
@@ -5979,27 +5862,36 @@
           <a:p>
             <a:r>
               <a:rPr lang="en-US" dirty="0"/>
-              <a:t>Purging Led to Table per Month Pattern</a:t>
-            </a:r>
-          </a:p>
-          <a:p>
-            <a:r>
-              <a:rPr lang="en-US" dirty="0"/>
-              <a:t>Eventually Needed Data in a Different Sort Order</a:t>
-            </a:r>
-          </a:p>
-          <a:p>
-            <a:r>
-              <a:rPr lang="en-US" dirty="0"/>
-              <a:t>Eventually Needed even more Querying Capability</a:t>
-            </a:r>
+              <a:t>Started Here</a:t>
+            </a:r>
+          </a:p>
+          <a:p>
+            <a:r>
+              <a:rPr lang="en-US" dirty="0"/>
+              <a:t>Felt Too Much like SSIS and Dump and Figure out Later</a:t>
+            </a:r>
+          </a:p>
+          <a:p>
+            <a:r>
+              <a:rPr lang="en-US" dirty="0"/>
+              <a:t>Not Running Real Time</a:t>
+            </a:r>
+          </a:p>
+          <a:p>
+            <a:r>
+              <a:rPr lang="en-US" dirty="0"/>
+              <a:t>Long Term vs Processing</a:t>
+            </a:r>
+          </a:p>
+          <a:p>
+            <a:endParaRPr lang="en-US" dirty="0"/>
           </a:p>
         </p:txBody>
       </p:sp>
     </p:spTree>
     <p:extLst>
       <p:ext uri="{BB962C8B-B14F-4D97-AF65-F5344CB8AC3E}">
-        <p14:creationId xmlns:p14="http://schemas.microsoft.com/office/powerpoint/2010/main" val="2392308974"/>
+        <p14:creationId xmlns:p14="http://schemas.microsoft.com/office/powerpoint/2010/main" val="3292344427"/>
       </p:ext>
     </p:extLst>
   </p:cSld>
@@ -6031,7 +5923,7 @@
           <p:cNvPr id="2" name="Title 1">
             <a:extLst>
               <a:ext uri="{FF2B5EF4-FFF2-40B4-BE49-F238E27FC236}">
-                <a16:creationId xmlns:a16="http://schemas.microsoft.com/office/drawing/2014/main" id="{5A05302F-6721-8B42-9BE5-B4D24A7E6BD7}"/>
+                <a16:creationId xmlns:a16="http://schemas.microsoft.com/office/drawing/2014/main" id="{C45B49D9-E096-9141-9721-1843D4B0881A}"/>
               </a:ext>
             </a:extLst>
           </p:cNvPr>
@@ -6048,12 +5940,8 @@
           <a:lstStyle/>
           <a:p>
             <a:r>
-              <a:rPr lang="en-US" dirty="0" err="1"/>
-              <a:t>CosmosDB</a:t>
-            </a:r>
-            <a:r>
-              <a:rPr lang="en-US" dirty="0"/>
-              <a:t> SQL API – The Good</a:t>
+              <a:rPr lang="en-US" dirty="0"/>
+              <a:t>Table Storage – The Good</a:t>
             </a:r>
           </a:p>
         </p:txBody>
@@ -6063,7 +5951,7 @@
           <p:cNvPr id="3" name="Content Placeholder 2">
             <a:extLst>
               <a:ext uri="{FF2B5EF4-FFF2-40B4-BE49-F238E27FC236}">
-                <a16:creationId xmlns:a16="http://schemas.microsoft.com/office/drawing/2014/main" id="{8398CB48-2BEF-4146-9A9F-845F8C8917DE}"/>
+                <a16:creationId xmlns:a16="http://schemas.microsoft.com/office/drawing/2014/main" id="{3C55FC4B-E29F-5644-856D-BBD9E1030EFB}"/>
               </a:ext>
             </a:extLst>
           </p:cNvPr>
@@ -6081,52 +5969,19 @@
           <a:p>
             <a:r>
               <a:rPr lang="en-US" dirty="0"/>
-              <a:t>Actually </a:t>
-            </a:r>
-            <a:r>
-              <a:rPr lang="en-US" dirty="0" err="1"/>
-              <a:t>NoSql</a:t>
-            </a:r>
-            <a:r>
-              <a:rPr lang="en-US" dirty="0"/>
-              <a:t> (Formally </a:t>
-            </a:r>
-            <a:r>
-              <a:rPr lang="en-US" dirty="0" err="1"/>
-              <a:t>DocumentDB</a:t>
-            </a:r>
-            <a:r>
-              <a:rPr lang="en-US" dirty="0"/>
-              <a:t>)</a:t>
-            </a:r>
-          </a:p>
-          <a:p>
-            <a:r>
-              <a:rPr lang="en-US" dirty="0"/>
-              <a:t>With correct Partition Key Fully Scalable</a:t>
-            </a:r>
-          </a:p>
-          <a:p>
-            <a:r>
-              <a:rPr lang="en-US" dirty="0"/>
-              <a:t>Fully </a:t>
-            </a:r>
-            <a:r>
-              <a:rPr lang="en-US" dirty="0" err="1"/>
-              <a:t>Queryable</a:t>
-            </a:r>
-            <a:endParaRPr lang="en-US" dirty="0"/>
-          </a:p>
-          <a:p>
-            <a:r>
-              <a:rPr lang="en-US" dirty="0"/>
-              <a:t>Ability to use Stored Procedure for Batch Transactions</a:t>
-            </a:r>
-          </a:p>
-          <a:p>
-            <a:r>
-              <a:rPr lang="en-US" dirty="0"/>
-              <a:t>Time To Live (TTL)</a:t>
+              <a:t>Had Natural Row and Partition Keys</a:t>
+            </a:r>
+          </a:p>
+          <a:p>
+            <a:r>
+              <a:rPr lang="en-US" dirty="0"/>
+              <a:t>Cheap and Easy</a:t>
+            </a:r>
+          </a:p>
+          <a:p>
+            <a:r>
+              <a:rPr lang="en-US" dirty="0"/>
+              <a:t>Made Sense for the first Process</a:t>
             </a:r>
           </a:p>
         </p:txBody>
@@ -6134,7 +5989,7 @@
     </p:spTree>
     <p:extLst>
       <p:ext uri="{BB962C8B-B14F-4D97-AF65-F5344CB8AC3E}">
-        <p14:creationId xmlns:p14="http://schemas.microsoft.com/office/powerpoint/2010/main" val="1949391135"/>
+        <p14:creationId xmlns:p14="http://schemas.microsoft.com/office/powerpoint/2010/main" val="2991144793"/>
       </p:ext>
     </p:extLst>
   </p:cSld>
@@ -6166,7 +6021,7 @@
           <p:cNvPr id="2" name="Title 1">
             <a:extLst>
               <a:ext uri="{FF2B5EF4-FFF2-40B4-BE49-F238E27FC236}">
-                <a16:creationId xmlns:a16="http://schemas.microsoft.com/office/drawing/2014/main" id="{228FB944-7D17-D246-AF9E-D8923A0B1F59}"/>
+                <a16:creationId xmlns:a16="http://schemas.microsoft.com/office/drawing/2014/main" id="{EB71402D-A8F6-514F-A089-594A0DF6836C}"/>
               </a:ext>
             </a:extLst>
           </p:cNvPr>
@@ -6184,15 +6039,7 @@
           <a:p>
             <a:r>
               <a:rPr lang="en-US" dirty="0"/>
-              <a:t>COSMOSDB </a:t>
-            </a:r>
-            <a:r>
-              <a:rPr lang="en-US" dirty="0" err="1"/>
-              <a:t>Sql</a:t>
-            </a:r>
-            <a:r>
-              <a:rPr lang="en-US" dirty="0"/>
-              <a:t> API – Had to Work through</a:t>
+              <a:t>Table Storage – Not as Good</a:t>
             </a:r>
           </a:p>
         </p:txBody>
@@ -6202,7 +6049,7 @@
           <p:cNvPr id="3" name="Content Placeholder 2">
             <a:extLst>
               <a:ext uri="{FF2B5EF4-FFF2-40B4-BE49-F238E27FC236}">
-                <a16:creationId xmlns:a16="http://schemas.microsoft.com/office/drawing/2014/main" id="{98357355-CCC0-8B44-A18D-5A2F3E94ED71}"/>
+                <a16:creationId xmlns:a16="http://schemas.microsoft.com/office/drawing/2014/main" id="{9E9A9433-6475-BB49-8A4C-B885B1400E53}"/>
               </a:ext>
             </a:extLst>
           </p:cNvPr>
@@ -6220,19 +6067,19 @@
           <a:p>
             <a:r>
               <a:rPr lang="en-US" dirty="0"/>
-              <a:t>Choosing Partition Keys is Hard</a:t>
-            </a:r>
-          </a:p>
-          <a:p>
-            <a:r>
-              <a:rPr lang="en-US" dirty="0"/>
-              <a:t>Deployment – Not Completely doable by ARM.  Custom Code</a:t>
-            </a:r>
-          </a:p>
-          <a:p>
-            <a:r>
-              <a:rPr lang="en-US" dirty="0"/>
-              <a:t>Collection != Table</a:t>
+              <a:t>Purging Led to Table per Month Pattern</a:t>
+            </a:r>
+          </a:p>
+          <a:p>
+            <a:r>
+              <a:rPr lang="en-US" dirty="0"/>
+              <a:t>Eventually Needed Data in a Different Sort Order</a:t>
+            </a:r>
+          </a:p>
+          <a:p>
+            <a:r>
+              <a:rPr lang="en-US" dirty="0"/>
+              <a:t>Eventually Needed even more Querying Capability</a:t>
             </a:r>
           </a:p>
         </p:txBody>
@@ -6240,7 +6087,7 @@
     </p:spTree>
     <p:extLst>
       <p:ext uri="{BB962C8B-B14F-4D97-AF65-F5344CB8AC3E}">
-        <p14:creationId xmlns:p14="http://schemas.microsoft.com/office/powerpoint/2010/main" val="3509745369"/>
+        <p14:creationId xmlns:p14="http://schemas.microsoft.com/office/powerpoint/2010/main" val="2392308974"/>
       </p:ext>
     </p:extLst>
   </p:cSld>
@@ -6272,6 +6119,247 @@
           <p:cNvPr id="2" name="Title 1">
             <a:extLst>
               <a:ext uri="{FF2B5EF4-FFF2-40B4-BE49-F238E27FC236}">
+                <a16:creationId xmlns:a16="http://schemas.microsoft.com/office/drawing/2014/main" id="{5A05302F-6721-8B42-9BE5-B4D24A7E6BD7}"/>
+              </a:ext>
+            </a:extLst>
+          </p:cNvPr>
+          <p:cNvSpPr>
+            <a:spLocks noGrp="1"/>
+          </p:cNvSpPr>
+          <p:nvPr>
+            <p:ph type="title"/>
+          </p:nvPr>
+        </p:nvSpPr>
+        <p:spPr/>
+        <p:txBody>
+          <a:bodyPr/>
+          <a:lstStyle/>
+          <a:p>
+            <a:r>
+              <a:rPr lang="en-US" dirty="0" err="1"/>
+              <a:t>CosmosDB</a:t>
+            </a:r>
+            <a:r>
+              <a:rPr lang="en-US" dirty="0"/>
+              <a:t> SQL API – The Good</a:t>
+            </a:r>
+          </a:p>
+        </p:txBody>
+      </p:sp>
+      <p:sp>
+        <p:nvSpPr>
+          <p:cNvPr id="3" name="Content Placeholder 2">
+            <a:extLst>
+              <a:ext uri="{FF2B5EF4-FFF2-40B4-BE49-F238E27FC236}">
+                <a16:creationId xmlns:a16="http://schemas.microsoft.com/office/drawing/2014/main" id="{8398CB48-2BEF-4146-9A9F-845F8C8917DE}"/>
+              </a:ext>
+            </a:extLst>
+          </p:cNvPr>
+          <p:cNvSpPr>
+            <a:spLocks noGrp="1"/>
+          </p:cNvSpPr>
+          <p:nvPr>
+            <p:ph idx="1"/>
+          </p:nvPr>
+        </p:nvSpPr>
+        <p:spPr/>
+        <p:txBody>
+          <a:bodyPr/>
+          <a:lstStyle/>
+          <a:p>
+            <a:r>
+              <a:rPr lang="en-US" dirty="0"/>
+              <a:t>Actually </a:t>
+            </a:r>
+            <a:r>
+              <a:rPr lang="en-US" dirty="0" err="1"/>
+              <a:t>NoSql</a:t>
+            </a:r>
+            <a:r>
+              <a:rPr lang="en-US" dirty="0"/>
+              <a:t> (Formally </a:t>
+            </a:r>
+            <a:r>
+              <a:rPr lang="en-US" dirty="0" err="1"/>
+              <a:t>DocumentDB</a:t>
+            </a:r>
+            <a:r>
+              <a:rPr lang="en-US" dirty="0"/>
+              <a:t>)</a:t>
+            </a:r>
+          </a:p>
+          <a:p>
+            <a:r>
+              <a:rPr lang="en-US" dirty="0"/>
+              <a:t>With correct Partition Key Fully Scalable</a:t>
+            </a:r>
+          </a:p>
+          <a:p>
+            <a:r>
+              <a:rPr lang="en-US" dirty="0"/>
+              <a:t>Fully </a:t>
+            </a:r>
+            <a:r>
+              <a:rPr lang="en-US" dirty="0" err="1"/>
+              <a:t>Queryable</a:t>
+            </a:r>
+            <a:endParaRPr lang="en-US" dirty="0"/>
+          </a:p>
+          <a:p>
+            <a:r>
+              <a:rPr lang="en-US" dirty="0"/>
+              <a:t>Ability to use Stored Procedure for Batch Transactions</a:t>
+            </a:r>
+          </a:p>
+          <a:p>
+            <a:r>
+              <a:rPr lang="en-US" dirty="0"/>
+              <a:t>Time To Live (TTL)</a:t>
+            </a:r>
+          </a:p>
+        </p:txBody>
+      </p:sp>
+    </p:spTree>
+    <p:extLst>
+      <p:ext uri="{BB962C8B-B14F-4D97-AF65-F5344CB8AC3E}">
+        <p14:creationId xmlns:p14="http://schemas.microsoft.com/office/powerpoint/2010/main" val="1949391135"/>
+      </p:ext>
+    </p:extLst>
+  </p:cSld>
+  <p:clrMapOvr>
+    <a:masterClrMapping/>
+  </p:clrMapOvr>
+</p:sld>
+</file>
+
+<file path=ppt/slides/slide25.xml><?xml version="1.0" encoding="utf-8"?>
+<p:sld xmlns:a="http://schemas.openxmlformats.org/drawingml/2006/main" xmlns:r="http://schemas.openxmlformats.org/officeDocument/2006/relationships" xmlns:p="http://schemas.openxmlformats.org/presentationml/2006/main">
+  <p:cSld>
+    <p:spTree>
+      <p:nvGrpSpPr>
+        <p:cNvPr id="1" name=""/>
+        <p:cNvGrpSpPr/>
+        <p:nvPr/>
+      </p:nvGrpSpPr>
+      <p:grpSpPr>
+        <a:xfrm>
+          <a:off x="0" y="0"/>
+          <a:ext cx="0" cy="0"/>
+          <a:chOff x="0" y="0"/>
+          <a:chExt cx="0" cy="0"/>
+        </a:xfrm>
+      </p:grpSpPr>
+      <p:sp>
+        <p:nvSpPr>
+          <p:cNvPr id="2" name="Title 1">
+            <a:extLst>
+              <a:ext uri="{FF2B5EF4-FFF2-40B4-BE49-F238E27FC236}">
+                <a16:creationId xmlns:a16="http://schemas.microsoft.com/office/drawing/2014/main" id="{228FB944-7D17-D246-AF9E-D8923A0B1F59}"/>
+              </a:ext>
+            </a:extLst>
+          </p:cNvPr>
+          <p:cNvSpPr>
+            <a:spLocks noGrp="1"/>
+          </p:cNvSpPr>
+          <p:nvPr>
+            <p:ph type="title"/>
+          </p:nvPr>
+        </p:nvSpPr>
+        <p:spPr/>
+        <p:txBody>
+          <a:bodyPr/>
+          <a:lstStyle/>
+          <a:p>
+            <a:r>
+              <a:rPr lang="en-US" dirty="0"/>
+              <a:t>COSMOSDB </a:t>
+            </a:r>
+            <a:r>
+              <a:rPr lang="en-US" dirty="0" err="1"/>
+              <a:t>Sql</a:t>
+            </a:r>
+            <a:r>
+              <a:rPr lang="en-US" dirty="0"/>
+              <a:t> API – Had to Work through</a:t>
+            </a:r>
+          </a:p>
+        </p:txBody>
+      </p:sp>
+      <p:sp>
+        <p:nvSpPr>
+          <p:cNvPr id="3" name="Content Placeholder 2">
+            <a:extLst>
+              <a:ext uri="{FF2B5EF4-FFF2-40B4-BE49-F238E27FC236}">
+                <a16:creationId xmlns:a16="http://schemas.microsoft.com/office/drawing/2014/main" id="{98357355-CCC0-8B44-A18D-5A2F3E94ED71}"/>
+              </a:ext>
+            </a:extLst>
+          </p:cNvPr>
+          <p:cNvSpPr>
+            <a:spLocks noGrp="1"/>
+          </p:cNvSpPr>
+          <p:nvPr>
+            <p:ph idx="1"/>
+          </p:nvPr>
+        </p:nvSpPr>
+        <p:spPr/>
+        <p:txBody>
+          <a:bodyPr/>
+          <a:lstStyle/>
+          <a:p>
+            <a:r>
+              <a:rPr lang="en-US" dirty="0"/>
+              <a:t>Choosing Partition Keys is Hard</a:t>
+            </a:r>
+          </a:p>
+          <a:p>
+            <a:r>
+              <a:rPr lang="en-US" dirty="0"/>
+              <a:t>Deployment – Not Completely doable by ARM.  Custom Code</a:t>
+            </a:r>
+          </a:p>
+          <a:p>
+            <a:r>
+              <a:rPr lang="en-US" dirty="0"/>
+              <a:t>Collection != Table</a:t>
+            </a:r>
+          </a:p>
+        </p:txBody>
+      </p:sp>
+    </p:spTree>
+    <p:extLst>
+      <p:ext uri="{BB962C8B-B14F-4D97-AF65-F5344CB8AC3E}">
+        <p14:creationId xmlns:p14="http://schemas.microsoft.com/office/powerpoint/2010/main" val="3509745369"/>
+      </p:ext>
+    </p:extLst>
+  </p:cSld>
+  <p:clrMapOvr>
+    <a:masterClrMapping/>
+  </p:clrMapOvr>
+</p:sld>
+</file>
+
+<file path=ppt/slides/slide26.xml><?xml version="1.0" encoding="utf-8"?>
+<p:sld xmlns:a="http://schemas.openxmlformats.org/drawingml/2006/main" xmlns:r="http://schemas.openxmlformats.org/officeDocument/2006/relationships" xmlns:p="http://schemas.openxmlformats.org/presentationml/2006/main">
+  <p:cSld>
+    <p:spTree>
+      <p:nvGrpSpPr>
+        <p:cNvPr id="1" name=""/>
+        <p:cNvGrpSpPr/>
+        <p:nvPr/>
+      </p:nvGrpSpPr>
+      <p:grpSpPr>
+        <a:xfrm>
+          <a:off x="0" y="0"/>
+          <a:ext cx="0" cy="0"/>
+          <a:chOff x="0" y="0"/>
+          <a:chExt cx="0" cy="0"/>
+        </a:xfrm>
+      </p:grpSpPr>
+      <p:sp>
+        <p:nvSpPr>
+          <p:cNvPr id="2" name="Title 1">
+            <a:extLst>
+              <a:ext uri="{FF2B5EF4-FFF2-40B4-BE49-F238E27FC236}">
                 <a16:creationId xmlns:a16="http://schemas.microsoft.com/office/drawing/2014/main" id="{ADDEEFAF-71E5-4440-9E00-EC649F4A4E32}"/>
               </a:ext>
             </a:extLst>
@@ -6348,7 +6436,7 @@
 </p:sld>
 </file>
 
-<file path=ppt/slides/slide25.xml><?xml version="1.0" encoding="utf-8"?>
+<file path=ppt/slides/slide27.xml><?xml version="1.0" encoding="utf-8"?>
 <p:sld xmlns:a="http://schemas.openxmlformats.org/drawingml/2006/main" xmlns:r="http://schemas.openxmlformats.org/officeDocument/2006/relationships" xmlns:p="http://schemas.openxmlformats.org/presentationml/2006/main">
   <p:cSld>
     <p:spTree>
@@ -6435,7 +6523,7 @@
 </p:sld>
 </file>
 
-<file path=ppt/slides/slide26.xml><?xml version="1.0" encoding="utf-8"?>
+<file path=ppt/slides/slide28.xml><?xml version="1.0" encoding="utf-8"?>
 <p:sld xmlns:a="http://schemas.openxmlformats.org/drawingml/2006/main" xmlns:r="http://schemas.openxmlformats.org/officeDocument/2006/relationships" xmlns:p="http://schemas.openxmlformats.org/presentationml/2006/main">
   <p:cSld>
     <p:spTree>
@@ -6539,7 +6627,7 @@
 </p:sld>
 </file>
 
-<file path=ppt/slides/slide27.xml><?xml version="1.0" encoding="utf-8"?>
+<file path=ppt/slides/slide29.xml><?xml version="1.0" encoding="utf-8"?>
 <p:sld xmlns:a="http://schemas.openxmlformats.org/drawingml/2006/main" xmlns:r="http://schemas.openxmlformats.org/officeDocument/2006/relationships" xmlns:p="http://schemas.openxmlformats.org/presentationml/2006/main">
   <p:cSld>
     <p:spTree>
@@ -6643,7 +6731,136 @@
 </p:sld>
 </file>
 
-<file path=ppt/slides/slide28.xml><?xml version="1.0" encoding="utf-8"?>
+<file path=ppt/slides/slide3.xml><?xml version="1.0" encoding="utf-8"?>
+<p:sld xmlns:a="http://schemas.openxmlformats.org/drawingml/2006/main" xmlns:r="http://schemas.openxmlformats.org/officeDocument/2006/relationships" xmlns:p="http://schemas.openxmlformats.org/presentationml/2006/main">
+  <p:cSld>
+    <p:spTree>
+      <p:nvGrpSpPr>
+        <p:cNvPr id="1" name=""/>
+        <p:cNvGrpSpPr/>
+        <p:nvPr/>
+      </p:nvGrpSpPr>
+      <p:grpSpPr>
+        <a:xfrm>
+          <a:off x="0" y="0"/>
+          <a:ext cx="0" cy="0"/>
+          <a:chOff x="0" y="0"/>
+          <a:chExt cx="0" cy="0"/>
+        </a:xfrm>
+      </p:grpSpPr>
+      <p:sp>
+        <p:nvSpPr>
+          <p:cNvPr id="2" name="Title 1">
+            <a:extLst>
+              <a:ext uri="{FF2B5EF4-FFF2-40B4-BE49-F238E27FC236}">
+                <a16:creationId xmlns:a16="http://schemas.microsoft.com/office/drawing/2014/main" id="{F047B8CF-0916-8147-B668-444D16F0462D}"/>
+              </a:ext>
+            </a:extLst>
+          </p:cNvPr>
+          <p:cNvSpPr>
+            <a:spLocks noGrp="1"/>
+          </p:cNvSpPr>
+          <p:nvPr>
+            <p:ph type="title"/>
+          </p:nvPr>
+        </p:nvSpPr>
+        <p:spPr/>
+        <p:txBody>
+          <a:bodyPr/>
+          <a:lstStyle/>
+          <a:p>
+            <a:pPr algn="ctr"/>
+            <a:r>
+              <a:rPr lang="en-US" dirty="0"/>
+              <a:t>Allen Zaudtke</a:t>
+            </a:r>
+          </a:p>
+        </p:txBody>
+      </p:sp>
+      <p:sp>
+        <p:nvSpPr>
+          <p:cNvPr id="3" name="Content Placeholder 2">
+            <a:extLst>
+              <a:ext uri="{FF2B5EF4-FFF2-40B4-BE49-F238E27FC236}">
+                <a16:creationId xmlns:a16="http://schemas.microsoft.com/office/drawing/2014/main" id="{78E81EC8-ED81-2544-8F9C-88C61B272CC6}"/>
+              </a:ext>
+            </a:extLst>
+          </p:cNvPr>
+          <p:cNvSpPr>
+            <a:spLocks noGrp="1"/>
+          </p:cNvSpPr>
+          <p:nvPr>
+            <p:ph idx="1"/>
+          </p:nvPr>
+        </p:nvSpPr>
+        <p:spPr/>
+        <p:txBody>
+          <a:bodyPr/>
+          <a:lstStyle/>
+          <a:p>
+            <a:r>
+              <a:rPr lang="en-US" dirty="0"/>
+              <a:t>Architect at J. J. Keller &amp; Associates, Inc.</a:t>
+            </a:r>
+          </a:p>
+          <a:p>
+            <a:r>
+              <a:rPr lang="en-US" dirty="0"/>
+              <a:t>Web and Cloud Applications</a:t>
+            </a:r>
+          </a:p>
+          <a:p>
+            <a:r>
+              <a:rPr lang="en-US" dirty="0"/>
+              <a:t>@</a:t>
+            </a:r>
+            <a:r>
+              <a:rPr lang="en-US" dirty="0" err="1"/>
+              <a:t>alzaudtke</a:t>
+            </a:r>
+            <a:endParaRPr lang="en-US" dirty="0"/>
+          </a:p>
+          <a:p>
+            <a:r>
+              <a:rPr lang="en-US" dirty="0"/>
+              <a:t>https://</a:t>
+            </a:r>
+            <a:r>
+              <a:rPr lang="en-US" dirty="0" err="1"/>
+              <a:t>github.com</a:t>
+            </a:r>
+            <a:r>
+              <a:rPr lang="en-US" dirty="0"/>
+              <a:t>/</a:t>
+            </a:r>
+            <a:r>
+              <a:rPr lang="en-US" dirty="0" err="1"/>
+              <a:t>zaudtke</a:t>
+            </a:r>
+            <a:endParaRPr lang="en-US" dirty="0"/>
+          </a:p>
+          <a:p>
+            <a:endParaRPr lang="en-US" dirty="0"/>
+          </a:p>
+          <a:p>
+            <a:endParaRPr lang="en-US" dirty="0"/>
+          </a:p>
+        </p:txBody>
+      </p:sp>
+    </p:spTree>
+    <p:extLst>
+      <p:ext uri="{BB962C8B-B14F-4D97-AF65-F5344CB8AC3E}">
+        <p14:creationId xmlns:p14="http://schemas.microsoft.com/office/powerpoint/2010/main" val="3572810702"/>
+      </p:ext>
+    </p:extLst>
+  </p:cSld>
+  <p:clrMapOvr>
+    <a:masterClrMapping/>
+  </p:clrMapOvr>
+</p:sld>
+</file>
+
+<file path=ppt/slides/slide30.xml><?xml version="1.0" encoding="utf-8"?>
 <p:sld xmlns:a="http://schemas.openxmlformats.org/drawingml/2006/main" xmlns:r="http://schemas.openxmlformats.org/officeDocument/2006/relationships" xmlns:p="http://schemas.openxmlformats.org/presentationml/2006/main">
   <p:cSld>
     <p:spTree>
@@ -6760,338 +6977,6 @@
 </p:sld>
 </file>
 
-<file path=ppt/slides/slide29.xml><?xml version="1.0" encoding="utf-8"?>
-<p:sld xmlns:a="http://schemas.openxmlformats.org/drawingml/2006/main" xmlns:r="http://schemas.openxmlformats.org/officeDocument/2006/relationships" xmlns:p="http://schemas.openxmlformats.org/presentationml/2006/main">
-  <p:cSld>
-    <p:spTree>
-      <p:nvGrpSpPr>
-        <p:cNvPr id="1" name=""/>
-        <p:cNvGrpSpPr/>
-        <p:nvPr/>
-      </p:nvGrpSpPr>
-      <p:grpSpPr>
-        <a:xfrm>
-          <a:off x="0" y="0"/>
-          <a:ext cx="0" cy="0"/>
-          <a:chOff x="0" y="0"/>
-          <a:chExt cx="0" cy="0"/>
-        </a:xfrm>
-      </p:grpSpPr>
-      <p:sp>
-        <p:nvSpPr>
-          <p:cNvPr id="2" name="Title 1">
-            <a:extLst>
-              <a:ext uri="{FF2B5EF4-FFF2-40B4-BE49-F238E27FC236}">
-                <a16:creationId xmlns:a16="http://schemas.microsoft.com/office/drawing/2014/main" id="{CEB6DC48-9564-444F-9069-C3B580E42357}"/>
-              </a:ext>
-            </a:extLst>
-          </p:cNvPr>
-          <p:cNvSpPr>
-            <a:spLocks noGrp="1"/>
-          </p:cNvSpPr>
-          <p:nvPr>
-            <p:ph type="title"/>
-          </p:nvPr>
-        </p:nvSpPr>
-        <p:spPr/>
-        <p:txBody>
-          <a:bodyPr/>
-          <a:lstStyle/>
-          <a:p>
-            <a:r>
-              <a:rPr lang="en-US" dirty="0"/>
-              <a:t>Thinking Differently</a:t>
-            </a:r>
-          </a:p>
-        </p:txBody>
-      </p:sp>
-      <p:sp>
-        <p:nvSpPr>
-          <p:cNvPr id="3" name="Content Placeholder 2">
-            <a:extLst>
-              <a:ext uri="{FF2B5EF4-FFF2-40B4-BE49-F238E27FC236}">
-                <a16:creationId xmlns:a16="http://schemas.microsoft.com/office/drawing/2014/main" id="{1E8832E1-986F-5A41-B0A4-849D2B677B54}"/>
-              </a:ext>
-            </a:extLst>
-          </p:cNvPr>
-          <p:cNvSpPr>
-            <a:spLocks noGrp="1"/>
-          </p:cNvSpPr>
-          <p:nvPr>
-            <p:ph idx="1"/>
-          </p:nvPr>
-        </p:nvSpPr>
-        <p:spPr/>
-        <p:txBody>
-          <a:bodyPr/>
-          <a:lstStyle/>
-          <a:p>
-            <a:r>
-              <a:rPr lang="en-US" dirty="0"/>
-              <a:t>More About How to Code in Cloud than Using Cloud</a:t>
-            </a:r>
-          </a:p>
-          <a:p>
-            <a:r>
-              <a:rPr lang="en-US" dirty="0"/>
-              <a:t>Get Data Up Front Not On-Demand</a:t>
-            </a:r>
-          </a:p>
-          <a:p>
-            <a:r>
-              <a:rPr lang="en-US" dirty="0"/>
-              <a:t>Functional Concepts (</a:t>
-            </a:r>
-            <a:r>
-              <a:rPr lang="en-US" dirty="0" err="1"/>
-              <a:t>Linq</a:t>
-            </a:r>
-            <a:r>
-              <a:rPr lang="en-US" dirty="0"/>
-              <a:t> and Custom Projections)</a:t>
-            </a:r>
-          </a:p>
-          <a:p>
-            <a:r>
-              <a:rPr lang="en-US" dirty="0"/>
-              <a:t>Allowing for 1 Error to Not Stop the Process</a:t>
-            </a:r>
-          </a:p>
-          <a:p>
-            <a:r>
-              <a:rPr lang="en-US" dirty="0"/>
-              <a:t>No Dependency Injection</a:t>
-            </a:r>
-          </a:p>
-        </p:txBody>
-      </p:sp>
-    </p:spTree>
-    <p:extLst>
-      <p:ext uri="{BB962C8B-B14F-4D97-AF65-F5344CB8AC3E}">
-        <p14:creationId xmlns:p14="http://schemas.microsoft.com/office/powerpoint/2010/main" val="2611474039"/>
-      </p:ext>
-    </p:extLst>
-  </p:cSld>
-  <p:clrMapOvr>
-    <a:masterClrMapping/>
-  </p:clrMapOvr>
-</p:sld>
-</file>
-
-<file path=ppt/slides/slide3.xml><?xml version="1.0" encoding="utf-8"?>
-<p:sld xmlns:a="http://schemas.openxmlformats.org/drawingml/2006/main" xmlns:r="http://schemas.openxmlformats.org/officeDocument/2006/relationships" xmlns:p="http://schemas.openxmlformats.org/presentationml/2006/main">
-  <p:cSld>
-    <p:spTree>
-      <p:nvGrpSpPr>
-        <p:cNvPr id="1" name=""/>
-        <p:cNvGrpSpPr/>
-        <p:nvPr/>
-      </p:nvGrpSpPr>
-      <p:grpSpPr>
-        <a:xfrm>
-          <a:off x="0" y="0"/>
-          <a:ext cx="0" cy="0"/>
-          <a:chOff x="0" y="0"/>
-          <a:chExt cx="0" cy="0"/>
-        </a:xfrm>
-      </p:grpSpPr>
-      <p:sp>
-        <p:nvSpPr>
-          <p:cNvPr id="2" name="Title 1">
-            <a:extLst>
-              <a:ext uri="{FF2B5EF4-FFF2-40B4-BE49-F238E27FC236}">
-                <a16:creationId xmlns:a16="http://schemas.microsoft.com/office/drawing/2014/main" id="{4D87EB31-B5D7-764E-9D12-C8EB0551825F}"/>
-              </a:ext>
-            </a:extLst>
-          </p:cNvPr>
-          <p:cNvSpPr>
-            <a:spLocks noGrp="1"/>
-          </p:cNvSpPr>
-          <p:nvPr>
-            <p:ph type="title"/>
-          </p:nvPr>
-        </p:nvSpPr>
-        <p:spPr/>
-        <p:txBody>
-          <a:bodyPr/>
-          <a:lstStyle/>
-          <a:p>
-            <a:r>
-              <a:rPr lang="en-US" dirty="0"/>
-              <a:t>Agenda</a:t>
-            </a:r>
-          </a:p>
-        </p:txBody>
-      </p:sp>
-      <p:sp>
-        <p:nvSpPr>
-          <p:cNvPr id="3" name="Content Placeholder 2">
-            <a:extLst>
-              <a:ext uri="{FF2B5EF4-FFF2-40B4-BE49-F238E27FC236}">
-                <a16:creationId xmlns:a16="http://schemas.microsoft.com/office/drawing/2014/main" id="{5B34470C-84D1-8A4D-A2C5-BB25DBBBC4FE}"/>
-              </a:ext>
-            </a:extLst>
-          </p:cNvPr>
-          <p:cNvSpPr>
-            <a:spLocks noGrp="1"/>
-          </p:cNvSpPr>
-          <p:nvPr>
-            <p:ph idx="1"/>
-          </p:nvPr>
-        </p:nvSpPr>
-        <p:spPr/>
-        <p:txBody>
-          <a:bodyPr/>
-          <a:lstStyle/>
-          <a:p>
-            <a:r>
-              <a:rPr lang="en-US" dirty="0"/>
-              <a:t>Explanation of the Application</a:t>
-            </a:r>
-          </a:p>
-          <a:p>
-            <a:r>
-              <a:rPr lang="en-US" dirty="0"/>
-              <a:t>Ingestion and Storage</a:t>
-            </a:r>
-          </a:p>
-          <a:p>
-            <a:r>
-              <a:rPr lang="en-US" dirty="0"/>
-              <a:t>Processing</a:t>
-            </a:r>
-          </a:p>
-          <a:p>
-            <a:r>
-              <a:rPr lang="en-US" dirty="0"/>
-              <a:t>Output</a:t>
-            </a:r>
-          </a:p>
-          <a:p>
-            <a:r>
-              <a:rPr lang="en-US" dirty="0"/>
-              <a:t>Future</a:t>
-            </a:r>
-          </a:p>
-        </p:txBody>
-      </p:sp>
-    </p:spTree>
-    <p:extLst>
-      <p:ext uri="{BB962C8B-B14F-4D97-AF65-F5344CB8AC3E}">
-        <p14:creationId xmlns:p14="http://schemas.microsoft.com/office/powerpoint/2010/main" val="4108712121"/>
-      </p:ext>
-    </p:extLst>
-  </p:cSld>
-  <p:clrMapOvr>
-    <a:masterClrMapping/>
-  </p:clrMapOvr>
-</p:sld>
-</file>
-
-<file path=ppt/slides/slide30.xml><?xml version="1.0" encoding="utf-8"?>
-<p:sld xmlns:a="http://schemas.openxmlformats.org/drawingml/2006/main" xmlns:r="http://schemas.openxmlformats.org/officeDocument/2006/relationships" xmlns:p="http://schemas.openxmlformats.org/presentationml/2006/main">
-  <p:cSld>
-    <p:spTree>
-      <p:nvGrpSpPr>
-        <p:cNvPr id="1" name=""/>
-        <p:cNvGrpSpPr/>
-        <p:nvPr/>
-      </p:nvGrpSpPr>
-      <p:grpSpPr>
-        <a:xfrm>
-          <a:off x="0" y="0"/>
-          <a:ext cx="0" cy="0"/>
-          <a:chOff x="0" y="0"/>
-          <a:chExt cx="0" cy="0"/>
-        </a:xfrm>
-      </p:grpSpPr>
-      <p:sp>
-        <p:nvSpPr>
-          <p:cNvPr id="2" name="Title 1">
-            <a:extLst>
-              <a:ext uri="{FF2B5EF4-FFF2-40B4-BE49-F238E27FC236}">
-                <a16:creationId xmlns:a16="http://schemas.microsoft.com/office/drawing/2014/main" id="{241773BA-DBAE-8E42-BA9D-A298FC8741A6}"/>
-              </a:ext>
-            </a:extLst>
-          </p:cNvPr>
-          <p:cNvSpPr>
-            <a:spLocks noGrp="1"/>
-          </p:cNvSpPr>
-          <p:nvPr>
-            <p:ph type="title"/>
-          </p:nvPr>
-        </p:nvSpPr>
-        <p:spPr/>
-        <p:txBody>
-          <a:bodyPr/>
-          <a:lstStyle/>
-          <a:p>
-            <a:r>
-              <a:rPr lang="en-US" dirty="0"/>
-              <a:t>Errors Service Bus</a:t>
-            </a:r>
-          </a:p>
-        </p:txBody>
-      </p:sp>
-      <p:sp>
-        <p:nvSpPr>
-          <p:cNvPr id="3" name="Content Placeholder 2">
-            <a:extLst>
-              <a:ext uri="{FF2B5EF4-FFF2-40B4-BE49-F238E27FC236}">
-                <a16:creationId xmlns:a16="http://schemas.microsoft.com/office/drawing/2014/main" id="{C6AF1F3E-227F-4844-90AE-661C4C2BCC0E}"/>
-              </a:ext>
-            </a:extLst>
-          </p:cNvPr>
-          <p:cNvSpPr>
-            <a:spLocks noGrp="1"/>
-          </p:cNvSpPr>
-          <p:nvPr>
-            <p:ph idx="1"/>
-          </p:nvPr>
-        </p:nvSpPr>
-        <p:spPr/>
-        <p:txBody>
-          <a:bodyPr/>
-          <a:lstStyle/>
-          <a:p>
-            <a:r>
-              <a:rPr lang="en-US" dirty="0"/>
-              <a:t>Add to Special Queue</a:t>
-            </a:r>
-          </a:p>
-          <a:p>
-            <a:r>
-              <a:rPr lang="en-US" dirty="0"/>
-              <a:t>Keep Retry Count</a:t>
-            </a:r>
-          </a:p>
-          <a:p>
-            <a:r>
-              <a:rPr lang="en-US" dirty="0"/>
-              <a:t>Process When Function Started</a:t>
-            </a:r>
-          </a:p>
-          <a:p>
-            <a:r>
-              <a:rPr lang="en-US" dirty="0"/>
-              <a:t>Max Retries Notification</a:t>
-            </a:r>
-          </a:p>
-        </p:txBody>
-      </p:sp>
-    </p:spTree>
-    <p:extLst>
-      <p:ext uri="{BB962C8B-B14F-4D97-AF65-F5344CB8AC3E}">
-        <p14:creationId xmlns:p14="http://schemas.microsoft.com/office/powerpoint/2010/main" val="2966799099"/>
-      </p:ext>
-    </p:extLst>
-  </p:cSld>
-  <p:clrMapOvr>
-    <a:masterClrMapping/>
-  </p:clrMapOvr>
-</p:sld>
-</file>
-
 <file path=ppt/slides/slide31.xml><?xml version="1.0" encoding="utf-8"?>
 <p:sld xmlns:a="http://schemas.openxmlformats.org/drawingml/2006/main" xmlns:r="http://schemas.openxmlformats.org/officeDocument/2006/relationships" xmlns:p="http://schemas.openxmlformats.org/presentationml/2006/main">
   <p:cSld>
@@ -7114,6 +6999,228 @@
           <p:cNvPr id="2" name="Title 1">
             <a:extLst>
               <a:ext uri="{FF2B5EF4-FFF2-40B4-BE49-F238E27FC236}">
+                <a16:creationId xmlns:a16="http://schemas.microsoft.com/office/drawing/2014/main" id="{CEB6DC48-9564-444F-9069-C3B580E42357}"/>
+              </a:ext>
+            </a:extLst>
+          </p:cNvPr>
+          <p:cNvSpPr>
+            <a:spLocks noGrp="1"/>
+          </p:cNvSpPr>
+          <p:nvPr>
+            <p:ph type="title"/>
+          </p:nvPr>
+        </p:nvSpPr>
+        <p:spPr/>
+        <p:txBody>
+          <a:bodyPr/>
+          <a:lstStyle/>
+          <a:p>
+            <a:r>
+              <a:rPr lang="en-US" dirty="0"/>
+              <a:t>USING FUNCTIONS - Thinking Differently</a:t>
+            </a:r>
+          </a:p>
+        </p:txBody>
+      </p:sp>
+      <p:sp>
+        <p:nvSpPr>
+          <p:cNvPr id="3" name="Content Placeholder 2">
+            <a:extLst>
+              <a:ext uri="{FF2B5EF4-FFF2-40B4-BE49-F238E27FC236}">
+                <a16:creationId xmlns:a16="http://schemas.microsoft.com/office/drawing/2014/main" id="{1E8832E1-986F-5A41-B0A4-849D2B677B54}"/>
+              </a:ext>
+            </a:extLst>
+          </p:cNvPr>
+          <p:cNvSpPr>
+            <a:spLocks noGrp="1"/>
+          </p:cNvSpPr>
+          <p:nvPr>
+            <p:ph idx="1"/>
+          </p:nvPr>
+        </p:nvSpPr>
+        <p:spPr/>
+        <p:txBody>
+          <a:bodyPr/>
+          <a:lstStyle/>
+          <a:p>
+            <a:r>
+              <a:rPr lang="en-US" dirty="0"/>
+              <a:t>More About How to Code in Cloud than Using Cloud</a:t>
+            </a:r>
+          </a:p>
+          <a:p>
+            <a:r>
+              <a:rPr lang="en-US" dirty="0"/>
+              <a:t>Get Data Up Front Not On-Demand</a:t>
+            </a:r>
+          </a:p>
+          <a:p>
+            <a:r>
+              <a:rPr lang="en-US" dirty="0"/>
+              <a:t>Functional Concepts (</a:t>
+            </a:r>
+            <a:r>
+              <a:rPr lang="en-US" dirty="0" err="1"/>
+              <a:t>Linq</a:t>
+            </a:r>
+            <a:r>
+              <a:rPr lang="en-US" dirty="0"/>
+              <a:t> and Custom Projections)</a:t>
+            </a:r>
+          </a:p>
+          <a:p>
+            <a:r>
+              <a:rPr lang="en-US" dirty="0"/>
+              <a:t>Allowing for 1 Error to Not Stop the Process</a:t>
+            </a:r>
+          </a:p>
+          <a:p>
+            <a:r>
+              <a:rPr lang="en-US" dirty="0"/>
+              <a:t>No Dependency Injection</a:t>
+            </a:r>
+          </a:p>
+        </p:txBody>
+      </p:sp>
+    </p:spTree>
+    <p:extLst>
+      <p:ext uri="{BB962C8B-B14F-4D97-AF65-F5344CB8AC3E}">
+        <p14:creationId xmlns:p14="http://schemas.microsoft.com/office/powerpoint/2010/main" val="2611474039"/>
+      </p:ext>
+    </p:extLst>
+  </p:cSld>
+  <p:clrMapOvr>
+    <a:masterClrMapping/>
+  </p:clrMapOvr>
+</p:sld>
+</file>
+
+<file path=ppt/slides/slide32.xml><?xml version="1.0" encoding="utf-8"?>
+<p:sld xmlns:a="http://schemas.openxmlformats.org/drawingml/2006/main" xmlns:r="http://schemas.openxmlformats.org/officeDocument/2006/relationships" xmlns:p="http://schemas.openxmlformats.org/presentationml/2006/main">
+  <p:cSld>
+    <p:spTree>
+      <p:nvGrpSpPr>
+        <p:cNvPr id="1" name=""/>
+        <p:cNvGrpSpPr/>
+        <p:nvPr/>
+      </p:nvGrpSpPr>
+      <p:grpSpPr>
+        <a:xfrm>
+          <a:off x="0" y="0"/>
+          <a:ext cx="0" cy="0"/>
+          <a:chOff x="0" y="0"/>
+          <a:chExt cx="0" cy="0"/>
+        </a:xfrm>
+      </p:grpSpPr>
+      <p:sp>
+        <p:nvSpPr>
+          <p:cNvPr id="2" name="Title 1">
+            <a:extLst>
+              <a:ext uri="{FF2B5EF4-FFF2-40B4-BE49-F238E27FC236}">
+                <a16:creationId xmlns:a16="http://schemas.microsoft.com/office/drawing/2014/main" id="{241773BA-DBAE-8E42-BA9D-A298FC8741A6}"/>
+              </a:ext>
+            </a:extLst>
+          </p:cNvPr>
+          <p:cNvSpPr>
+            <a:spLocks noGrp="1"/>
+          </p:cNvSpPr>
+          <p:nvPr>
+            <p:ph type="title"/>
+          </p:nvPr>
+        </p:nvSpPr>
+        <p:spPr/>
+        <p:txBody>
+          <a:bodyPr/>
+          <a:lstStyle/>
+          <a:p>
+            <a:r>
+              <a:rPr lang="en-US" dirty="0"/>
+              <a:t>Errors Service Bus</a:t>
+            </a:r>
+          </a:p>
+        </p:txBody>
+      </p:sp>
+      <p:sp>
+        <p:nvSpPr>
+          <p:cNvPr id="3" name="Content Placeholder 2">
+            <a:extLst>
+              <a:ext uri="{FF2B5EF4-FFF2-40B4-BE49-F238E27FC236}">
+                <a16:creationId xmlns:a16="http://schemas.microsoft.com/office/drawing/2014/main" id="{C6AF1F3E-227F-4844-90AE-661C4C2BCC0E}"/>
+              </a:ext>
+            </a:extLst>
+          </p:cNvPr>
+          <p:cNvSpPr>
+            <a:spLocks noGrp="1"/>
+          </p:cNvSpPr>
+          <p:nvPr>
+            <p:ph idx="1"/>
+          </p:nvPr>
+        </p:nvSpPr>
+        <p:spPr/>
+        <p:txBody>
+          <a:bodyPr/>
+          <a:lstStyle/>
+          <a:p>
+            <a:r>
+              <a:rPr lang="en-US" dirty="0"/>
+              <a:t>Add to Special Queue</a:t>
+            </a:r>
+          </a:p>
+          <a:p>
+            <a:r>
+              <a:rPr lang="en-US" dirty="0"/>
+              <a:t>Keep Retry Count</a:t>
+            </a:r>
+          </a:p>
+          <a:p>
+            <a:r>
+              <a:rPr lang="en-US" dirty="0"/>
+              <a:t>Process When Function Started</a:t>
+            </a:r>
+          </a:p>
+          <a:p>
+            <a:r>
+              <a:rPr lang="en-US" dirty="0"/>
+              <a:t>Max Retries Notification</a:t>
+            </a:r>
+          </a:p>
+        </p:txBody>
+      </p:sp>
+    </p:spTree>
+    <p:extLst>
+      <p:ext uri="{BB962C8B-B14F-4D97-AF65-F5344CB8AC3E}">
+        <p14:creationId xmlns:p14="http://schemas.microsoft.com/office/powerpoint/2010/main" val="2966799099"/>
+      </p:ext>
+    </p:extLst>
+  </p:cSld>
+  <p:clrMapOvr>
+    <a:masterClrMapping/>
+  </p:clrMapOvr>
+</p:sld>
+</file>
+
+<file path=ppt/slides/slide33.xml><?xml version="1.0" encoding="utf-8"?>
+<p:sld xmlns:a="http://schemas.openxmlformats.org/drawingml/2006/main" xmlns:r="http://schemas.openxmlformats.org/officeDocument/2006/relationships" xmlns:p="http://schemas.openxmlformats.org/presentationml/2006/main">
+  <p:cSld>
+    <p:spTree>
+      <p:nvGrpSpPr>
+        <p:cNvPr id="1" name=""/>
+        <p:cNvGrpSpPr/>
+        <p:nvPr/>
+      </p:nvGrpSpPr>
+      <p:grpSpPr>
+        <a:xfrm>
+          <a:off x="0" y="0"/>
+          <a:ext cx="0" cy="0"/>
+          <a:chOff x="0" y="0"/>
+          <a:chExt cx="0" cy="0"/>
+        </a:xfrm>
+      </p:grpSpPr>
+      <p:sp>
+        <p:nvSpPr>
+          <p:cNvPr id="2" name="Title 1">
+            <a:extLst>
+              <a:ext uri="{FF2B5EF4-FFF2-40B4-BE49-F238E27FC236}">
                 <a16:creationId xmlns:a16="http://schemas.microsoft.com/office/drawing/2014/main" id="{C50994D9-1FCE-A34F-A597-D97B00753CED}"/>
               </a:ext>
             </a:extLst>
@@ -7188,7 +7295,7 @@
 </p:sld>
 </file>
 
-<file path=ppt/slides/slide32.xml><?xml version="1.0" encoding="utf-8"?>
+<file path=ppt/slides/slide34.xml><?xml version="1.0" encoding="utf-8"?>
 <p:sld xmlns:a="http://schemas.openxmlformats.org/drawingml/2006/main" xmlns:r="http://schemas.openxmlformats.org/officeDocument/2006/relationships" xmlns:p="http://schemas.openxmlformats.org/presentationml/2006/main">
   <p:cSld>
     <p:spTree>
@@ -7275,217 +7382,6 @@
 </p:sld>
 </file>
 
-<file path=ppt/slides/slide33.xml><?xml version="1.0" encoding="utf-8"?>
-<p:sld xmlns:a="http://schemas.openxmlformats.org/drawingml/2006/main" xmlns:r="http://schemas.openxmlformats.org/officeDocument/2006/relationships" xmlns:p="http://schemas.openxmlformats.org/presentationml/2006/main">
-  <p:cSld>
-    <p:spTree>
-      <p:nvGrpSpPr>
-        <p:cNvPr id="1" name=""/>
-        <p:cNvGrpSpPr/>
-        <p:nvPr/>
-      </p:nvGrpSpPr>
-      <p:grpSpPr>
-        <a:xfrm>
-          <a:off x="0" y="0"/>
-          <a:ext cx="0" cy="0"/>
-          <a:chOff x="0" y="0"/>
-          <a:chExt cx="0" cy="0"/>
-        </a:xfrm>
-      </p:grpSpPr>
-      <p:sp>
-        <p:nvSpPr>
-          <p:cNvPr id="2" name="Title 1">
-            <a:extLst>
-              <a:ext uri="{FF2B5EF4-FFF2-40B4-BE49-F238E27FC236}">
-                <a16:creationId xmlns:a16="http://schemas.microsoft.com/office/drawing/2014/main" id="{504B0804-5B08-DA4D-B196-A4BE93B8A2C8}"/>
-              </a:ext>
-            </a:extLst>
-          </p:cNvPr>
-          <p:cNvSpPr>
-            <a:spLocks noGrp="1"/>
-          </p:cNvSpPr>
-          <p:nvPr>
-            <p:ph type="title"/>
-          </p:nvPr>
-        </p:nvSpPr>
-        <p:spPr/>
-        <p:txBody>
-          <a:bodyPr/>
-          <a:lstStyle/>
-          <a:p>
-            <a:r>
-              <a:rPr lang="en-US" dirty="0"/>
-              <a:t>Output</a:t>
-            </a:r>
-          </a:p>
-        </p:txBody>
-      </p:sp>
-      <p:sp>
-        <p:nvSpPr>
-          <p:cNvPr id="3" name="Content Placeholder 2">
-            <a:extLst>
-              <a:ext uri="{FF2B5EF4-FFF2-40B4-BE49-F238E27FC236}">
-                <a16:creationId xmlns:a16="http://schemas.microsoft.com/office/drawing/2014/main" id="{F04DFA2F-1DFF-7C4D-868B-1DE1E6B49F73}"/>
-              </a:ext>
-            </a:extLst>
-          </p:cNvPr>
-          <p:cNvSpPr>
-            <a:spLocks noGrp="1"/>
-          </p:cNvSpPr>
-          <p:nvPr>
-            <p:ph idx="1"/>
-          </p:nvPr>
-        </p:nvSpPr>
-        <p:spPr/>
-        <p:txBody>
-          <a:bodyPr/>
-          <a:lstStyle/>
-          <a:p>
-            <a:r>
-              <a:rPr lang="en-US" dirty="0"/>
-              <a:t>Database Still On Premise</a:t>
-            </a:r>
-          </a:p>
-          <a:p>
-            <a:r>
-              <a:rPr lang="en-US" dirty="0"/>
-              <a:t>Have Express Route, but would have required shipping data across regions</a:t>
-            </a:r>
-          </a:p>
-          <a:p>
-            <a:r>
-              <a:rPr lang="en-US" dirty="0"/>
-              <a:t>Ongoing Work Limited Ability to Change Application</a:t>
-            </a:r>
-          </a:p>
-          <a:p>
-            <a:r>
-              <a:rPr lang="en-US" dirty="0"/>
-              <a:t>Multiple Approaches Taken</a:t>
-            </a:r>
-          </a:p>
-        </p:txBody>
-      </p:sp>
-    </p:spTree>
-    <p:extLst>
-      <p:ext uri="{BB962C8B-B14F-4D97-AF65-F5344CB8AC3E}">
-        <p14:creationId xmlns:p14="http://schemas.microsoft.com/office/powerpoint/2010/main" val="4160769968"/>
-      </p:ext>
-    </p:extLst>
-  </p:cSld>
-  <p:clrMapOvr>
-    <a:masterClrMapping/>
-  </p:clrMapOvr>
-</p:sld>
-</file>
-
-<file path=ppt/slides/slide34.xml><?xml version="1.0" encoding="utf-8"?>
-<p:sld xmlns:a="http://schemas.openxmlformats.org/drawingml/2006/main" xmlns:r="http://schemas.openxmlformats.org/officeDocument/2006/relationships" xmlns:p="http://schemas.openxmlformats.org/presentationml/2006/main">
-  <p:cSld>
-    <p:spTree>
-      <p:nvGrpSpPr>
-        <p:cNvPr id="1" name=""/>
-        <p:cNvGrpSpPr/>
-        <p:nvPr/>
-      </p:nvGrpSpPr>
-      <p:grpSpPr>
-        <a:xfrm>
-          <a:off x="0" y="0"/>
-          <a:ext cx="0" cy="0"/>
-          <a:chOff x="0" y="0"/>
-          <a:chExt cx="0" cy="0"/>
-        </a:xfrm>
-      </p:grpSpPr>
-      <p:sp>
-        <p:nvSpPr>
-          <p:cNvPr id="2" name="Title 1">
-            <a:extLst>
-              <a:ext uri="{FF2B5EF4-FFF2-40B4-BE49-F238E27FC236}">
-                <a16:creationId xmlns:a16="http://schemas.microsoft.com/office/drawing/2014/main" id="{590D1E90-102F-5849-92FA-11EB4CBD21A0}"/>
-              </a:ext>
-            </a:extLst>
-          </p:cNvPr>
-          <p:cNvSpPr>
-            <a:spLocks noGrp="1"/>
-          </p:cNvSpPr>
-          <p:nvPr>
-            <p:ph type="title"/>
-          </p:nvPr>
-        </p:nvSpPr>
-        <p:spPr/>
-        <p:txBody>
-          <a:bodyPr/>
-          <a:lstStyle/>
-          <a:p>
-            <a:r>
-              <a:rPr lang="en-US" dirty="0"/>
-              <a:t>Approach 1</a:t>
-            </a:r>
-          </a:p>
-        </p:txBody>
-      </p:sp>
-      <p:sp>
-        <p:nvSpPr>
-          <p:cNvPr id="3" name="Content Placeholder 2">
-            <a:extLst>
-              <a:ext uri="{FF2B5EF4-FFF2-40B4-BE49-F238E27FC236}">
-                <a16:creationId xmlns:a16="http://schemas.microsoft.com/office/drawing/2014/main" id="{BEACB0F2-EA22-9443-BFCE-2F092844CF41}"/>
-              </a:ext>
-            </a:extLst>
-          </p:cNvPr>
-          <p:cNvSpPr>
-            <a:spLocks noGrp="1"/>
-          </p:cNvSpPr>
-          <p:nvPr>
-            <p:ph idx="1"/>
-          </p:nvPr>
-        </p:nvSpPr>
-        <p:spPr/>
-        <p:txBody>
-          <a:bodyPr/>
-          <a:lstStyle/>
-          <a:p>
-            <a:r>
-              <a:rPr lang="en-US" dirty="0"/>
-              <a:t>Service Bus Queue</a:t>
-            </a:r>
-          </a:p>
-          <a:p>
-            <a:r>
-              <a:rPr lang="en-US" dirty="0"/>
-              <a:t>Windows Service On Premise</a:t>
-            </a:r>
-          </a:p>
-          <a:p>
-            <a:r>
-              <a:rPr lang="en-US" dirty="0"/>
-              <a:t>Pull Model</a:t>
-            </a:r>
-          </a:p>
-          <a:p>
-            <a:r>
-              <a:rPr lang="en-US" dirty="0"/>
-              <a:t>Avoid Express Route</a:t>
-            </a:r>
-          </a:p>
-          <a:p>
-            <a:endParaRPr lang="en-US" dirty="0"/>
-          </a:p>
-        </p:txBody>
-      </p:sp>
-    </p:spTree>
-    <p:extLst>
-      <p:ext uri="{BB962C8B-B14F-4D97-AF65-F5344CB8AC3E}">
-        <p14:creationId xmlns:p14="http://schemas.microsoft.com/office/powerpoint/2010/main" val="2895058997"/>
-      </p:ext>
-    </p:extLst>
-  </p:cSld>
-  <p:clrMapOvr>
-    <a:masterClrMapping/>
-  </p:clrMapOvr>
-</p:sld>
-</file>
-
 <file path=ppt/slides/slide35.xml><?xml version="1.0" encoding="utf-8"?>
 <p:sld xmlns:a="http://schemas.openxmlformats.org/drawingml/2006/main" xmlns:r="http://schemas.openxmlformats.org/officeDocument/2006/relationships" xmlns:p="http://schemas.openxmlformats.org/presentationml/2006/main">
   <p:cSld>
@@ -7508,7 +7404,7 @@
           <p:cNvPr id="2" name="Title 1">
             <a:extLst>
               <a:ext uri="{FF2B5EF4-FFF2-40B4-BE49-F238E27FC236}">
-                <a16:creationId xmlns:a16="http://schemas.microsoft.com/office/drawing/2014/main" id="{38406ADB-E188-9844-8405-6872BCF70B1F}"/>
+                <a16:creationId xmlns:a16="http://schemas.microsoft.com/office/drawing/2014/main" id="{504B0804-5B08-DA4D-B196-A4BE93B8A2C8}"/>
               </a:ext>
             </a:extLst>
           </p:cNvPr>
@@ -7526,7 +7422,7 @@
           <a:p>
             <a:r>
               <a:rPr lang="en-US" dirty="0"/>
-              <a:t>Approach 2</a:t>
+              <a:t>Output</a:t>
             </a:r>
           </a:p>
         </p:txBody>
@@ -7536,7 +7432,7 @@
           <p:cNvPr id="3" name="Content Placeholder 2">
             <a:extLst>
               <a:ext uri="{FF2B5EF4-FFF2-40B4-BE49-F238E27FC236}">
-                <a16:creationId xmlns:a16="http://schemas.microsoft.com/office/drawing/2014/main" id="{1A083CF1-C8D6-664E-8096-7E5C537D3765}"/>
+                <a16:creationId xmlns:a16="http://schemas.microsoft.com/office/drawing/2014/main" id="{F04DFA2F-1DFF-7C4D-868B-1DE1E6B49F73}"/>
               </a:ext>
             </a:extLst>
           </p:cNvPr>
@@ -7553,39 +7449,26 @@
           <a:lstStyle/>
           <a:p>
             <a:r>
-              <a:rPr lang="en-US" dirty="0" err="1"/>
-              <a:t>CosmosDB</a:t>
-            </a:r>
-            <a:endParaRPr lang="en-US" dirty="0"/>
-          </a:p>
-          <a:p>
-            <a:r>
-              <a:rPr lang="en-US" dirty="0"/>
-              <a:t>Change Feed</a:t>
-            </a:r>
-          </a:p>
-          <a:p>
-            <a:r>
-              <a:rPr lang="en-US" dirty="0"/>
-              <a:t>Windows Service On Premise</a:t>
-            </a:r>
-          </a:p>
-          <a:p>
-            <a:r>
-              <a:rPr lang="en-US" dirty="0"/>
-              <a:t>Pull Model</a:t>
-            </a:r>
-          </a:p>
-          <a:p>
-            <a:r>
-              <a:rPr lang="en-US" dirty="0"/>
-              <a:t>Avoids Express Route</a:t>
-            </a:r>
-          </a:p>
-          <a:p>
-            <a:r>
-              <a:rPr lang="en-US" dirty="0"/>
-              <a:t>Deletes Not in Change Feed</a:t>
+              <a:rPr lang="en-US" dirty="0"/>
+              <a:t>Database Still On Premise</a:t>
+            </a:r>
+          </a:p>
+          <a:p>
+            <a:r>
+              <a:rPr lang="en-US" dirty="0"/>
+              <a:t>Have Express Route, but would have required shipping data across regions</a:t>
+            </a:r>
+          </a:p>
+          <a:p>
+            <a:r>
+              <a:rPr lang="en-US" dirty="0"/>
+              <a:t>Ongoing Work Limited Ability to Change Application</a:t>
+            </a:r>
+          </a:p>
+          <a:p>
+            <a:r>
+              <a:rPr lang="en-US" dirty="0"/>
+              <a:t>Multiple Approaches Taken</a:t>
             </a:r>
           </a:p>
         </p:txBody>
@@ -7593,7 +7476,7 @@
     </p:spTree>
     <p:extLst>
       <p:ext uri="{BB962C8B-B14F-4D97-AF65-F5344CB8AC3E}">
-        <p14:creationId xmlns:p14="http://schemas.microsoft.com/office/powerpoint/2010/main" val="464471771"/>
+        <p14:creationId xmlns:p14="http://schemas.microsoft.com/office/powerpoint/2010/main" val="4160769968"/>
       </p:ext>
     </p:extLst>
   </p:cSld>
@@ -7625,6 +7508,230 @@
           <p:cNvPr id="2" name="Title 1">
             <a:extLst>
               <a:ext uri="{FF2B5EF4-FFF2-40B4-BE49-F238E27FC236}">
+                <a16:creationId xmlns:a16="http://schemas.microsoft.com/office/drawing/2014/main" id="{590D1E90-102F-5849-92FA-11EB4CBD21A0}"/>
+              </a:ext>
+            </a:extLst>
+          </p:cNvPr>
+          <p:cNvSpPr>
+            <a:spLocks noGrp="1"/>
+          </p:cNvSpPr>
+          <p:nvPr>
+            <p:ph type="title"/>
+          </p:nvPr>
+        </p:nvSpPr>
+        <p:spPr/>
+        <p:txBody>
+          <a:bodyPr/>
+          <a:lstStyle/>
+          <a:p>
+            <a:r>
+              <a:rPr lang="en-US" dirty="0"/>
+              <a:t>Approach 1</a:t>
+            </a:r>
+          </a:p>
+        </p:txBody>
+      </p:sp>
+      <p:sp>
+        <p:nvSpPr>
+          <p:cNvPr id="3" name="Content Placeholder 2">
+            <a:extLst>
+              <a:ext uri="{FF2B5EF4-FFF2-40B4-BE49-F238E27FC236}">
+                <a16:creationId xmlns:a16="http://schemas.microsoft.com/office/drawing/2014/main" id="{BEACB0F2-EA22-9443-BFCE-2F092844CF41}"/>
+              </a:ext>
+            </a:extLst>
+          </p:cNvPr>
+          <p:cNvSpPr>
+            <a:spLocks noGrp="1"/>
+          </p:cNvSpPr>
+          <p:nvPr>
+            <p:ph idx="1"/>
+          </p:nvPr>
+        </p:nvSpPr>
+        <p:spPr/>
+        <p:txBody>
+          <a:bodyPr/>
+          <a:lstStyle/>
+          <a:p>
+            <a:r>
+              <a:rPr lang="en-US" dirty="0"/>
+              <a:t>Service Bus Queue</a:t>
+            </a:r>
+          </a:p>
+          <a:p>
+            <a:r>
+              <a:rPr lang="en-US" dirty="0"/>
+              <a:t>Windows Service On Premise</a:t>
+            </a:r>
+          </a:p>
+          <a:p>
+            <a:r>
+              <a:rPr lang="en-US" dirty="0"/>
+              <a:t>Pull Model</a:t>
+            </a:r>
+          </a:p>
+          <a:p>
+            <a:r>
+              <a:rPr lang="en-US" dirty="0"/>
+              <a:t>Avoid Express Route</a:t>
+            </a:r>
+          </a:p>
+          <a:p>
+            <a:endParaRPr lang="en-US" dirty="0"/>
+          </a:p>
+        </p:txBody>
+      </p:sp>
+    </p:spTree>
+    <p:extLst>
+      <p:ext uri="{BB962C8B-B14F-4D97-AF65-F5344CB8AC3E}">
+        <p14:creationId xmlns:p14="http://schemas.microsoft.com/office/powerpoint/2010/main" val="2895058997"/>
+      </p:ext>
+    </p:extLst>
+  </p:cSld>
+  <p:clrMapOvr>
+    <a:masterClrMapping/>
+  </p:clrMapOvr>
+</p:sld>
+</file>
+
+<file path=ppt/slides/slide37.xml><?xml version="1.0" encoding="utf-8"?>
+<p:sld xmlns:a="http://schemas.openxmlformats.org/drawingml/2006/main" xmlns:r="http://schemas.openxmlformats.org/officeDocument/2006/relationships" xmlns:p="http://schemas.openxmlformats.org/presentationml/2006/main">
+  <p:cSld>
+    <p:spTree>
+      <p:nvGrpSpPr>
+        <p:cNvPr id="1" name=""/>
+        <p:cNvGrpSpPr/>
+        <p:nvPr/>
+      </p:nvGrpSpPr>
+      <p:grpSpPr>
+        <a:xfrm>
+          <a:off x="0" y="0"/>
+          <a:ext cx="0" cy="0"/>
+          <a:chOff x="0" y="0"/>
+          <a:chExt cx="0" cy="0"/>
+        </a:xfrm>
+      </p:grpSpPr>
+      <p:sp>
+        <p:nvSpPr>
+          <p:cNvPr id="2" name="Title 1">
+            <a:extLst>
+              <a:ext uri="{FF2B5EF4-FFF2-40B4-BE49-F238E27FC236}">
+                <a16:creationId xmlns:a16="http://schemas.microsoft.com/office/drawing/2014/main" id="{38406ADB-E188-9844-8405-6872BCF70B1F}"/>
+              </a:ext>
+            </a:extLst>
+          </p:cNvPr>
+          <p:cNvSpPr>
+            <a:spLocks noGrp="1"/>
+          </p:cNvSpPr>
+          <p:nvPr>
+            <p:ph type="title"/>
+          </p:nvPr>
+        </p:nvSpPr>
+        <p:spPr/>
+        <p:txBody>
+          <a:bodyPr/>
+          <a:lstStyle/>
+          <a:p>
+            <a:r>
+              <a:rPr lang="en-US" dirty="0"/>
+              <a:t>Approach 2</a:t>
+            </a:r>
+          </a:p>
+        </p:txBody>
+      </p:sp>
+      <p:sp>
+        <p:nvSpPr>
+          <p:cNvPr id="3" name="Content Placeholder 2">
+            <a:extLst>
+              <a:ext uri="{FF2B5EF4-FFF2-40B4-BE49-F238E27FC236}">
+                <a16:creationId xmlns:a16="http://schemas.microsoft.com/office/drawing/2014/main" id="{1A083CF1-C8D6-664E-8096-7E5C537D3765}"/>
+              </a:ext>
+            </a:extLst>
+          </p:cNvPr>
+          <p:cNvSpPr>
+            <a:spLocks noGrp="1"/>
+          </p:cNvSpPr>
+          <p:nvPr>
+            <p:ph idx="1"/>
+          </p:nvPr>
+        </p:nvSpPr>
+        <p:spPr/>
+        <p:txBody>
+          <a:bodyPr/>
+          <a:lstStyle/>
+          <a:p>
+            <a:r>
+              <a:rPr lang="en-US" dirty="0" err="1"/>
+              <a:t>CosmosDB</a:t>
+            </a:r>
+            <a:endParaRPr lang="en-US" dirty="0"/>
+          </a:p>
+          <a:p>
+            <a:r>
+              <a:rPr lang="en-US" dirty="0"/>
+              <a:t>Change Feed</a:t>
+            </a:r>
+          </a:p>
+          <a:p>
+            <a:r>
+              <a:rPr lang="en-US" dirty="0"/>
+              <a:t>Windows Service On Premise</a:t>
+            </a:r>
+          </a:p>
+          <a:p>
+            <a:r>
+              <a:rPr lang="en-US" dirty="0"/>
+              <a:t>Pull Model</a:t>
+            </a:r>
+          </a:p>
+          <a:p>
+            <a:r>
+              <a:rPr lang="en-US" dirty="0"/>
+              <a:t>Avoids Express Route</a:t>
+            </a:r>
+          </a:p>
+          <a:p>
+            <a:r>
+              <a:rPr lang="en-US" dirty="0"/>
+              <a:t>Deletes Not in Change Feed</a:t>
+            </a:r>
+          </a:p>
+        </p:txBody>
+      </p:sp>
+    </p:spTree>
+    <p:extLst>
+      <p:ext uri="{BB962C8B-B14F-4D97-AF65-F5344CB8AC3E}">
+        <p14:creationId xmlns:p14="http://schemas.microsoft.com/office/powerpoint/2010/main" val="464471771"/>
+      </p:ext>
+    </p:extLst>
+  </p:cSld>
+  <p:clrMapOvr>
+    <a:masterClrMapping/>
+  </p:clrMapOvr>
+</p:sld>
+</file>
+
+<file path=ppt/slides/slide38.xml><?xml version="1.0" encoding="utf-8"?>
+<p:sld xmlns:a="http://schemas.openxmlformats.org/drawingml/2006/main" xmlns:r="http://schemas.openxmlformats.org/officeDocument/2006/relationships" xmlns:p="http://schemas.openxmlformats.org/presentationml/2006/main">
+  <p:cSld>
+    <p:spTree>
+      <p:nvGrpSpPr>
+        <p:cNvPr id="1" name=""/>
+        <p:cNvGrpSpPr/>
+        <p:nvPr/>
+      </p:nvGrpSpPr>
+      <p:grpSpPr>
+        <a:xfrm>
+          <a:off x="0" y="0"/>
+          <a:ext cx="0" cy="0"/>
+          <a:chOff x="0" y="0"/>
+          <a:chExt cx="0" cy="0"/>
+        </a:xfrm>
+      </p:grpSpPr>
+      <p:sp>
+        <p:nvSpPr>
+          <p:cNvPr id="2" name="Title 1">
+            <a:extLst>
+              <a:ext uri="{FF2B5EF4-FFF2-40B4-BE49-F238E27FC236}">
                 <a16:creationId xmlns:a16="http://schemas.microsoft.com/office/drawing/2014/main" id="{E4163866-F632-E448-8401-B9B7F86C2D12}"/>
               </a:ext>
             </a:extLst>
@@ -7671,19 +7778,19 @@
           <a:p>
             <a:r>
               <a:rPr lang="en-US" dirty="0"/>
-              <a:t>Allow us to more easily Insert Batch</a:t>
-            </a:r>
-          </a:p>
-          <a:p>
-            <a:r>
-              <a:rPr lang="en-US" dirty="0"/>
-              <a:t>Allow us to Merge in Batch</a:t>
-            </a:r>
-          </a:p>
-          <a:p>
-            <a:r>
-              <a:rPr lang="en-US" dirty="0"/>
-              <a:t>Less impact on Database than current</a:t>
+              <a:t>Allow us to more easily Insert in Batches</a:t>
+            </a:r>
+          </a:p>
+          <a:p>
+            <a:r>
+              <a:rPr lang="en-US" dirty="0"/>
+              <a:t>Allow us to Update in Batches</a:t>
+            </a:r>
+          </a:p>
+          <a:p>
+            <a:r>
+              <a:rPr lang="en-US" dirty="0"/>
+              <a:t>Less impact on Database than previous solution</a:t>
             </a:r>
           </a:p>
         </p:txBody>
@@ -7701,7 +7808,7 @@
 </p:sld>
 </file>
 
-<file path=ppt/slides/slide37.xml><?xml version="1.0" encoding="utf-8"?>
+<file path=ppt/slides/slide39.xml><?xml version="1.0" encoding="utf-8"?>
 <p:sld xmlns:a="http://schemas.openxmlformats.org/drawingml/2006/main" xmlns:r="http://schemas.openxmlformats.org/officeDocument/2006/relationships" xmlns:p="http://schemas.openxmlformats.org/presentationml/2006/main">
   <p:cSld>
     <p:spTree>
@@ -7788,7 +7895,7 @@
 </p:sld>
 </file>
 
-<file path=ppt/slides/slide38.xml><?xml version="1.0" encoding="utf-8"?>
+<file path=ppt/slides/slide4.xml><?xml version="1.0" encoding="utf-8"?>
 <p:sld xmlns:a="http://schemas.openxmlformats.org/drawingml/2006/main" xmlns:r="http://schemas.openxmlformats.org/officeDocument/2006/relationships" xmlns:p="http://schemas.openxmlformats.org/presentationml/2006/main">
   <p:cSld>
     <p:spTree>
@@ -7810,6 +7917,116 @@
           <p:cNvPr id="2" name="Title 1">
             <a:extLst>
               <a:ext uri="{FF2B5EF4-FFF2-40B4-BE49-F238E27FC236}">
+                <a16:creationId xmlns:a16="http://schemas.microsoft.com/office/drawing/2014/main" id="{4D87EB31-B5D7-764E-9D12-C8EB0551825F}"/>
+              </a:ext>
+            </a:extLst>
+          </p:cNvPr>
+          <p:cNvSpPr>
+            <a:spLocks noGrp="1"/>
+          </p:cNvSpPr>
+          <p:nvPr>
+            <p:ph type="title"/>
+          </p:nvPr>
+        </p:nvSpPr>
+        <p:spPr/>
+        <p:txBody>
+          <a:bodyPr/>
+          <a:lstStyle/>
+          <a:p>
+            <a:r>
+              <a:rPr lang="en-US" dirty="0"/>
+              <a:t>Agenda</a:t>
+            </a:r>
+          </a:p>
+        </p:txBody>
+      </p:sp>
+      <p:sp>
+        <p:nvSpPr>
+          <p:cNvPr id="3" name="Content Placeholder 2">
+            <a:extLst>
+              <a:ext uri="{FF2B5EF4-FFF2-40B4-BE49-F238E27FC236}">
+                <a16:creationId xmlns:a16="http://schemas.microsoft.com/office/drawing/2014/main" id="{5B34470C-84D1-8A4D-A2C5-BB25DBBBC4FE}"/>
+              </a:ext>
+            </a:extLst>
+          </p:cNvPr>
+          <p:cNvSpPr>
+            <a:spLocks noGrp="1"/>
+          </p:cNvSpPr>
+          <p:nvPr>
+            <p:ph idx="1"/>
+          </p:nvPr>
+        </p:nvSpPr>
+        <p:spPr/>
+        <p:txBody>
+          <a:bodyPr/>
+          <a:lstStyle/>
+          <a:p>
+            <a:r>
+              <a:rPr lang="en-US" dirty="0"/>
+              <a:t>Brief Overview of Application</a:t>
+            </a:r>
+          </a:p>
+          <a:p>
+            <a:r>
+              <a:rPr lang="en-US" dirty="0"/>
+              <a:t>Ingestion and Storage </a:t>
+            </a:r>
+          </a:p>
+          <a:p>
+            <a:r>
+              <a:rPr lang="en-US" dirty="0"/>
+              <a:t>Processing</a:t>
+            </a:r>
+          </a:p>
+          <a:p>
+            <a:r>
+              <a:rPr lang="en-US" dirty="0"/>
+              <a:t>Output</a:t>
+            </a:r>
+          </a:p>
+          <a:p>
+            <a:r>
+              <a:rPr lang="en-US" dirty="0"/>
+              <a:t>Future</a:t>
+            </a:r>
+          </a:p>
+        </p:txBody>
+      </p:sp>
+    </p:spTree>
+    <p:extLst>
+      <p:ext uri="{BB962C8B-B14F-4D97-AF65-F5344CB8AC3E}">
+        <p14:creationId xmlns:p14="http://schemas.microsoft.com/office/powerpoint/2010/main" val="4108712121"/>
+      </p:ext>
+    </p:extLst>
+  </p:cSld>
+  <p:clrMapOvr>
+    <a:masterClrMapping/>
+  </p:clrMapOvr>
+</p:sld>
+</file>
+
+<file path=ppt/slides/slide40.xml><?xml version="1.0" encoding="utf-8"?>
+<p:sld xmlns:a="http://schemas.openxmlformats.org/drawingml/2006/main" xmlns:r="http://schemas.openxmlformats.org/officeDocument/2006/relationships" xmlns:p="http://schemas.openxmlformats.org/presentationml/2006/main">
+  <p:cSld>
+    <p:spTree>
+      <p:nvGrpSpPr>
+        <p:cNvPr id="1" name=""/>
+        <p:cNvGrpSpPr/>
+        <p:nvPr/>
+      </p:nvGrpSpPr>
+      <p:grpSpPr>
+        <a:xfrm>
+          <a:off x="0" y="0"/>
+          <a:ext cx="0" cy="0"/>
+          <a:chOff x="0" y="0"/>
+          <a:chExt cx="0" cy="0"/>
+        </a:xfrm>
+      </p:grpSpPr>
+      <p:sp>
+        <p:nvSpPr>
+          <p:cNvPr id="2" name="Title 1">
+            <a:extLst>
+              <a:ext uri="{FF2B5EF4-FFF2-40B4-BE49-F238E27FC236}">
                 <a16:creationId xmlns:a16="http://schemas.microsoft.com/office/drawing/2014/main" id="{E7D21AC6-E4AC-E34F-8DC4-69349C30A49E}"/>
               </a:ext>
             </a:extLst>
@@ -7892,7 +8109,7 @@
 </p:sld>
 </file>
 
-<file path=ppt/slides/slide39.xml><?xml version="1.0" encoding="utf-8"?>
+<file path=ppt/slides/slide41.xml><?xml version="1.0" encoding="utf-8"?>
 <p:sld xmlns:a="http://schemas.openxmlformats.org/drawingml/2006/main" xmlns:r="http://schemas.openxmlformats.org/officeDocument/2006/relationships" xmlns:p="http://schemas.openxmlformats.org/presentationml/2006/main">
   <p:cSld>
     <p:spTree>
@@ -7979,327 +8196,6 @@
 </p:sld>
 </file>
 
-<file path=ppt/slides/slide4.xml><?xml version="1.0" encoding="utf-8"?>
-<p:sld xmlns:a="http://schemas.openxmlformats.org/drawingml/2006/main" xmlns:r="http://schemas.openxmlformats.org/officeDocument/2006/relationships" xmlns:p="http://schemas.openxmlformats.org/presentationml/2006/main">
-  <p:cSld>
-    <p:spTree>
-      <p:nvGrpSpPr>
-        <p:cNvPr id="1" name=""/>
-        <p:cNvGrpSpPr/>
-        <p:nvPr/>
-      </p:nvGrpSpPr>
-      <p:grpSpPr>
-        <a:xfrm>
-          <a:off x="0" y="0"/>
-          <a:ext cx="0" cy="0"/>
-          <a:chOff x="0" y="0"/>
-          <a:chExt cx="0" cy="0"/>
-        </a:xfrm>
-      </p:grpSpPr>
-      <p:sp>
-        <p:nvSpPr>
-          <p:cNvPr id="2" name="Title 1">
-            <a:extLst>
-              <a:ext uri="{FF2B5EF4-FFF2-40B4-BE49-F238E27FC236}">
-                <a16:creationId xmlns:a16="http://schemas.microsoft.com/office/drawing/2014/main" id="{1A3F4E8B-BDD4-F241-ADDD-54B5F6AD92C2}"/>
-              </a:ext>
-            </a:extLst>
-          </p:cNvPr>
-          <p:cNvSpPr>
-            <a:spLocks noGrp="1"/>
-          </p:cNvSpPr>
-          <p:nvPr>
-            <p:ph type="title"/>
-          </p:nvPr>
-        </p:nvSpPr>
-        <p:spPr/>
-        <p:txBody>
-          <a:bodyPr/>
-          <a:lstStyle/>
-          <a:p>
-            <a:r>
-              <a:rPr lang="en-US" dirty="0"/>
-              <a:t>What the application Does</a:t>
-            </a:r>
-          </a:p>
-        </p:txBody>
-      </p:sp>
-      <p:sp>
-        <p:nvSpPr>
-          <p:cNvPr id="3" name="Content Placeholder 2">
-            <a:extLst>
-              <a:ext uri="{FF2B5EF4-FFF2-40B4-BE49-F238E27FC236}">
-                <a16:creationId xmlns:a16="http://schemas.microsoft.com/office/drawing/2014/main" id="{3D113710-C11F-0048-B9E1-61400E1EF662}"/>
-              </a:ext>
-            </a:extLst>
-          </p:cNvPr>
-          <p:cNvSpPr>
-            <a:spLocks noGrp="1"/>
-          </p:cNvSpPr>
-          <p:nvPr>
-            <p:ph idx="1"/>
-          </p:nvPr>
-        </p:nvSpPr>
-        <p:spPr/>
-        <p:txBody>
-          <a:bodyPr/>
-          <a:lstStyle/>
-          <a:p>
-            <a:r>
-              <a:rPr lang="en-US" dirty="0"/>
-              <a:t>Collect Engine Data</a:t>
-            </a:r>
-          </a:p>
-          <a:p>
-            <a:r>
-              <a:rPr lang="en-US" dirty="0"/>
-              <a:t>Submit to Cloud</a:t>
-            </a:r>
-          </a:p>
-          <a:p>
-            <a:r>
-              <a:rPr lang="en-US" dirty="0"/>
-              <a:t>Process and Store Data</a:t>
-            </a:r>
-          </a:p>
-          <a:p>
-            <a:r>
-              <a:rPr lang="en-US" dirty="0"/>
-              <a:t>Report via Web application</a:t>
-            </a:r>
-          </a:p>
-        </p:txBody>
-      </p:sp>
-    </p:spTree>
-    <p:extLst>
-      <p:ext uri="{BB962C8B-B14F-4D97-AF65-F5344CB8AC3E}">
-        <p14:creationId xmlns:p14="http://schemas.microsoft.com/office/powerpoint/2010/main" val="293339291"/>
-      </p:ext>
-    </p:extLst>
-  </p:cSld>
-  <p:clrMapOvr>
-    <a:masterClrMapping/>
-  </p:clrMapOvr>
-</p:sld>
-</file>
-
-<file path=ppt/slides/slide40.xml><?xml version="1.0" encoding="utf-8"?>
-<p:sld xmlns:a="http://schemas.openxmlformats.org/drawingml/2006/main" xmlns:r="http://schemas.openxmlformats.org/officeDocument/2006/relationships" xmlns:p="http://schemas.openxmlformats.org/presentationml/2006/main">
-  <p:cSld>
-    <p:spTree>
-      <p:nvGrpSpPr>
-        <p:cNvPr id="1" name=""/>
-        <p:cNvGrpSpPr/>
-        <p:nvPr/>
-      </p:nvGrpSpPr>
-      <p:grpSpPr>
-        <a:xfrm>
-          <a:off x="0" y="0"/>
-          <a:ext cx="0" cy="0"/>
-          <a:chOff x="0" y="0"/>
-          <a:chExt cx="0" cy="0"/>
-        </a:xfrm>
-      </p:grpSpPr>
-      <p:sp>
-        <p:nvSpPr>
-          <p:cNvPr id="2" name="Title 1">
-            <a:extLst>
-              <a:ext uri="{FF2B5EF4-FFF2-40B4-BE49-F238E27FC236}">
-                <a16:creationId xmlns:a16="http://schemas.microsoft.com/office/drawing/2014/main" id="{4A543EF6-9220-B04C-B478-AD1E22326943}"/>
-              </a:ext>
-            </a:extLst>
-          </p:cNvPr>
-          <p:cNvSpPr>
-            <a:spLocks noGrp="1"/>
-          </p:cNvSpPr>
-          <p:nvPr>
-            <p:ph type="title"/>
-          </p:nvPr>
-        </p:nvSpPr>
-        <p:spPr/>
-        <p:txBody>
-          <a:bodyPr/>
-          <a:lstStyle/>
-          <a:p>
-            <a:r>
-              <a:rPr lang="en-US" dirty="0"/>
-              <a:t>Future</a:t>
-            </a:r>
-          </a:p>
-        </p:txBody>
-      </p:sp>
-      <p:sp>
-        <p:nvSpPr>
-          <p:cNvPr id="3" name="Content Placeholder 2">
-            <a:extLst>
-              <a:ext uri="{FF2B5EF4-FFF2-40B4-BE49-F238E27FC236}">
-                <a16:creationId xmlns:a16="http://schemas.microsoft.com/office/drawing/2014/main" id="{B897AD3D-6550-0845-AD88-453340EC9F6C}"/>
-              </a:ext>
-            </a:extLst>
-          </p:cNvPr>
-          <p:cNvSpPr>
-            <a:spLocks noGrp="1"/>
-          </p:cNvSpPr>
-          <p:nvPr>
-            <p:ph idx="1"/>
-          </p:nvPr>
-        </p:nvSpPr>
-        <p:spPr/>
-        <p:txBody>
-          <a:bodyPr/>
-          <a:lstStyle/>
-          <a:p>
-            <a:r>
-              <a:rPr lang="en-US" dirty="0"/>
-              <a:t>1 Ingestion Function instead of 5</a:t>
-            </a:r>
-          </a:p>
-          <a:p>
-            <a:r>
-              <a:rPr lang="en-US" dirty="0"/>
-              <a:t>Remove Table Storage</a:t>
-            </a:r>
-          </a:p>
-          <a:p>
-            <a:r>
-              <a:rPr lang="en-US" dirty="0"/>
-              <a:t>Use Change Feed </a:t>
-            </a:r>
-          </a:p>
-          <a:p>
-            <a:pPr lvl="1"/>
-            <a:r>
-              <a:rPr lang="en-US" dirty="0"/>
-              <a:t>Less Queues</a:t>
-            </a:r>
-          </a:p>
-          <a:p>
-            <a:pPr lvl="1"/>
-            <a:r>
-              <a:rPr lang="en-US" dirty="0"/>
-              <a:t>More Streamlined</a:t>
-            </a:r>
-          </a:p>
-          <a:p>
-            <a:pPr lvl="1"/>
-            <a:r>
-              <a:rPr lang="en-US" dirty="0"/>
-              <a:t>More Event Driven</a:t>
-            </a:r>
-          </a:p>
-          <a:p>
-            <a:endParaRPr lang="en-US" dirty="0"/>
-          </a:p>
-        </p:txBody>
-      </p:sp>
-    </p:spTree>
-    <p:extLst>
-      <p:ext uri="{BB962C8B-B14F-4D97-AF65-F5344CB8AC3E}">
-        <p14:creationId xmlns:p14="http://schemas.microsoft.com/office/powerpoint/2010/main" val="2578040575"/>
-      </p:ext>
-    </p:extLst>
-  </p:cSld>
-  <p:clrMapOvr>
-    <a:masterClrMapping/>
-  </p:clrMapOvr>
-</p:sld>
-</file>
-
-<file path=ppt/slides/slide41.xml><?xml version="1.0" encoding="utf-8"?>
-<p:sld xmlns:a="http://schemas.openxmlformats.org/drawingml/2006/main" xmlns:r="http://schemas.openxmlformats.org/officeDocument/2006/relationships" xmlns:p="http://schemas.openxmlformats.org/presentationml/2006/main">
-  <p:cSld>
-    <p:spTree>
-      <p:nvGrpSpPr>
-        <p:cNvPr id="1" name=""/>
-        <p:cNvGrpSpPr/>
-        <p:nvPr/>
-      </p:nvGrpSpPr>
-      <p:grpSpPr>
-        <a:xfrm>
-          <a:off x="0" y="0"/>
-          <a:ext cx="0" cy="0"/>
-          <a:chOff x="0" y="0"/>
-          <a:chExt cx="0" cy="0"/>
-        </a:xfrm>
-      </p:grpSpPr>
-      <p:sp>
-        <p:nvSpPr>
-          <p:cNvPr id="2" name="Title 1">
-            <a:extLst>
-              <a:ext uri="{FF2B5EF4-FFF2-40B4-BE49-F238E27FC236}">
-                <a16:creationId xmlns:a16="http://schemas.microsoft.com/office/drawing/2014/main" id="{B43629C1-17EF-944B-A9D8-CB71D88AB14E}"/>
-              </a:ext>
-            </a:extLst>
-          </p:cNvPr>
-          <p:cNvSpPr>
-            <a:spLocks noGrp="1"/>
-          </p:cNvSpPr>
-          <p:nvPr>
-            <p:ph type="title"/>
-          </p:nvPr>
-        </p:nvSpPr>
-        <p:spPr/>
-        <p:txBody>
-          <a:bodyPr/>
-          <a:lstStyle/>
-          <a:p>
-            <a:r>
-              <a:rPr lang="en-US" dirty="0"/>
-              <a:t>Future Continued</a:t>
-            </a:r>
-          </a:p>
-        </p:txBody>
-      </p:sp>
-      <p:sp>
-        <p:nvSpPr>
-          <p:cNvPr id="3" name="Content Placeholder 2">
-            <a:extLst>
-              <a:ext uri="{FF2B5EF4-FFF2-40B4-BE49-F238E27FC236}">
-                <a16:creationId xmlns:a16="http://schemas.microsoft.com/office/drawing/2014/main" id="{FEFCB861-C26F-6641-B6B1-8914A432EA8B}"/>
-              </a:ext>
-            </a:extLst>
-          </p:cNvPr>
-          <p:cNvSpPr>
-            <a:spLocks noGrp="1"/>
-          </p:cNvSpPr>
-          <p:nvPr>
-            <p:ph idx="1"/>
-          </p:nvPr>
-        </p:nvSpPr>
-        <p:spPr/>
-        <p:txBody>
-          <a:bodyPr/>
-          <a:lstStyle/>
-          <a:p>
-            <a:r>
-              <a:rPr lang="en-US" dirty="0"/>
-              <a:t>Database now in Azure – Remove Windows Service</a:t>
-            </a:r>
-          </a:p>
-          <a:p>
-            <a:r>
-              <a:rPr lang="en-US" dirty="0"/>
-              <a:t>Push Model using Connectors</a:t>
-            </a:r>
-          </a:p>
-          <a:p>
-            <a:endParaRPr lang="en-US" dirty="0"/>
-          </a:p>
-        </p:txBody>
-      </p:sp>
-    </p:spTree>
-    <p:extLst>
-      <p:ext uri="{BB962C8B-B14F-4D97-AF65-F5344CB8AC3E}">
-        <p14:creationId xmlns:p14="http://schemas.microsoft.com/office/powerpoint/2010/main" val="181554734"/>
-      </p:ext>
-    </p:extLst>
-  </p:cSld>
-  <p:clrMapOvr>
-    <a:masterClrMapping/>
-  </p:clrMapOvr>
-</p:sld>
-</file>
-
 <file path=ppt/slides/slide42.xml><?xml version="1.0" encoding="utf-8"?>
 <p:sld xmlns:a="http://schemas.openxmlformats.org/drawingml/2006/main" xmlns:r="http://schemas.openxmlformats.org/officeDocument/2006/relationships" xmlns:p="http://schemas.openxmlformats.org/presentationml/2006/main">
   <p:cSld>
@@ -8322,6 +8218,223 @@
           <p:cNvPr id="2" name="Title 1">
             <a:extLst>
               <a:ext uri="{FF2B5EF4-FFF2-40B4-BE49-F238E27FC236}">
+                <a16:creationId xmlns:a16="http://schemas.microsoft.com/office/drawing/2014/main" id="{4A543EF6-9220-B04C-B478-AD1E22326943}"/>
+              </a:ext>
+            </a:extLst>
+          </p:cNvPr>
+          <p:cNvSpPr>
+            <a:spLocks noGrp="1"/>
+          </p:cNvSpPr>
+          <p:nvPr>
+            <p:ph type="title"/>
+          </p:nvPr>
+        </p:nvSpPr>
+        <p:spPr/>
+        <p:txBody>
+          <a:bodyPr/>
+          <a:lstStyle/>
+          <a:p>
+            <a:r>
+              <a:rPr lang="en-US" dirty="0"/>
+              <a:t>Future</a:t>
+            </a:r>
+          </a:p>
+        </p:txBody>
+      </p:sp>
+      <p:sp>
+        <p:nvSpPr>
+          <p:cNvPr id="3" name="Content Placeholder 2">
+            <a:extLst>
+              <a:ext uri="{FF2B5EF4-FFF2-40B4-BE49-F238E27FC236}">
+                <a16:creationId xmlns:a16="http://schemas.microsoft.com/office/drawing/2014/main" id="{B897AD3D-6550-0845-AD88-453340EC9F6C}"/>
+              </a:ext>
+            </a:extLst>
+          </p:cNvPr>
+          <p:cNvSpPr>
+            <a:spLocks noGrp="1"/>
+          </p:cNvSpPr>
+          <p:nvPr>
+            <p:ph idx="1"/>
+          </p:nvPr>
+        </p:nvSpPr>
+        <p:spPr/>
+        <p:txBody>
+          <a:bodyPr/>
+          <a:lstStyle/>
+          <a:p>
+            <a:r>
+              <a:rPr lang="en-US" dirty="0"/>
+              <a:t>1 Ingestion Function instead of 5</a:t>
+            </a:r>
+          </a:p>
+          <a:p>
+            <a:r>
+              <a:rPr lang="en-US" dirty="0"/>
+              <a:t>Remove Table Storage</a:t>
+            </a:r>
+          </a:p>
+          <a:p>
+            <a:r>
+              <a:rPr lang="en-US" dirty="0"/>
+              <a:t>Use Change Feed </a:t>
+            </a:r>
+          </a:p>
+          <a:p>
+            <a:pPr lvl="1"/>
+            <a:r>
+              <a:rPr lang="en-US" dirty="0"/>
+              <a:t>Less Queues</a:t>
+            </a:r>
+          </a:p>
+          <a:p>
+            <a:pPr lvl="1"/>
+            <a:r>
+              <a:rPr lang="en-US" dirty="0"/>
+              <a:t>More Streamlined</a:t>
+            </a:r>
+          </a:p>
+          <a:p>
+            <a:pPr lvl="1"/>
+            <a:r>
+              <a:rPr lang="en-US" dirty="0"/>
+              <a:t>More Event Driven</a:t>
+            </a:r>
+          </a:p>
+          <a:p>
+            <a:endParaRPr lang="en-US" dirty="0"/>
+          </a:p>
+        </p:txBody>
+      </p:sp>
+    </p:spTree>
+    <p:extLst>
+      <p:ext uri="{BB962C8B-B14F-4D97-AF65-F5344CB8AC3E}">
+        <p14:creationId xmlns:p14="http://schemas.microsoft.com/office/powerpoint/2010/main" val="2578040575"/>
+      </p:ext>
+    </p:extLst>
+  </p:cSld>
+  <p:clrMapOvr>
+    <a:masterClrMapping/>
+  </p:clrMapOvr>
+</p:sld>
+</file>
+
+<file path=ppt/slides/slide43.xml><?xml version="1.0" encoding="utf-8"?>
+<p:sld xmlns:a="http://schemas.openxmlformats.org/drawingml/2006/main" xmlns:r="http://schemas.openxmlformats.org/officeDocument/2006/relationships" xmlns:p="http://schemas.openxmlformats.org/presentationml/2006/main">
+  <p:cSld>
+    <p:spTree>
+      <p:nvGrpSpPr>
+        <p:cNvPr id="1" name=""/>
+        <p:cNvGrpSpPr/>
+        <p:nvPr/>
+      </p:nvGrpSpPr>
+      <p:grpSpPr>
+        <a:xfrm>
+          <a:off x="0" y="0"/>
+          <a:ext cx="0" cy="0"/>
+          <a:chOff x="0" y="0"/>
+          <a:chExt cx="0" cy="0"/>
+        </a:xfrm>
+      </p:grpSpPr>
+      <p:sp>
+        <p:nvSpPr>
+          <p:cNvPr id="2" name="Title 1">
+            <a:extLst>
+              <a:ext uri="{FF2B5EF4-FFF2-40B4-BE49-F238E27FC236}">
+                <a16:creationId xmlns:a16="http://schemas.microsoft.com/office/drawing/2014/main" id="{B43629C1-17EF-944B-A9D8-CB71D88AB14E}"/>
+              </a:ext>
+            </a:extLst>
+          </p:cNvPr>
+          <p:cNvSpPr>
+            <a:spLocks noGrp="1"/>
+          </p:cNvSpPr>
+          <p:nvPr>
+            <p:ph type="title"/>
+          </p:nvPr>
+        </p:nvSpPr>
+        <p:spPr/>
+        <p:txBody>
+          <a:bodyPr/>
+          <a:lstStyle/>
+          <a:p>
+            <a:r>
+              <a:rPr lang="en-US" dirty="0"/>
+              <a:t>Future Continued</a:t>
+            </a:r>
+          </a:p>
+        </p:txBody>
+      </p:sp>
+      <p:sp>
+        <p:nvSpPr>
+          <p:cNvPr id="3" name="Content Placeholder 2">
+            <a:extLst>
+              <a:ext uri="{FF2B5EF4-FFF2-40B4-BE49-F238E27FC236}">
+                <a16:creationId xmlns:a16="http://schemas.microsoft.com/office/drawing/2014/main" id="{FEFCB861-C26F-6641-B6B1-8914A432EA8B}"/>
+              </a:ext>
+            </a:extLst>
+          </p:cNvPr>
+          <p:cNvSpPr>
+            <a:spLocks noGrp="1"/>
+          </p:cNvSpPr>
+          <p:nvPr>
+            <p:ph idx="1"/>
+          </p:nvPr>
+        </p:nvSpPr>
+        <p:spPr/>
+        <p:txBody>
+          <a:bodyPr/>
+          <a:lstStyle/>
+          <a:p>
+            <a:r>
+              <a:rPr lang="en-US" dirty="0"/>
+              <a:t>Database now in Azure – Remove Windows Service</a:t>
+            </a:r>
+          </a:p>
+          <a:p>
+            <a:r>
+              <a:rPr lang="en-US" dirty="0"/>
+              <a:t>Push Model using Connectors</a:t>
+            </a:r>
+          </a:p>
+          <a:p>
+            <a:endParaRPr lang="en-US" dirty="0"/>
+          </a:p>
+        </p:txBody>
+      </p:sp>
+    </p:spTree>
+    <p:extLst>
+      <p:ext uri="{BB962C8B-B14F-4D97-AF65-F5344CB8AC3E}">
+        <p14:creationId xmlns:p14="http://schemas.microsoft.com/office/powerpoint/2010/main" val="181554734"/>
+      </p:ext>
+    </p:extLst>
+  </p:cSld>
+  <p:clrMapOvr>
+    <a:masterClrMapping/>
+  </p:clrMapOvr>
+</p:sld>
+</file>
+
+<file path=ppt/slides/slide44.xml><?xml version="1.0" encoding="utf-8"?>
+<p:sld xmlns:a="http://schemas.openxmlformats.org/drawingml/2006/main" xmlns:r="http://schemas.openxmlformats.org/officeDocument/2006/relationships" xmlns:p="http://schemas.openxmlformats.org/presentationml/2006/main">
+  <p:cSld>
+    <p:spTree>
+      <p:nvGrpSpPr>
+        <p:cNvPr id="1" name=""/>
+        <p:cNvGrpSpPr/>
+        <p:nvPr/>
+      </p:nvGrpSpPr>
+      <p:grpSpPr>
+        <a:xfrm>
+          <a:off x="0" y="0"/>
+          <a:ext cx="0" cy="0"/>
+          <a:chOff x="0" y="0"/>
+          <a:chExt cx="0" cy="0"/>
+        </a:xfrm>
+      </p:grpSpPr>
+      <p:sp>
+        <p:nvSpPr>
+          <p:cNvPr id="2" name="Title 1">
+            <a:extLst>
+              <a:ext uri="{FF2B5EF4-FFF2-40B4-BE49-F238E27FC236}">
                 <a16:creationId xmlns:a16="http://schemas.microsoft.com/office/drawing/2014/main" id="{3B269826-7182-9742-89E0-344E0335588A}"/>
               </a:ext>
             </a:extLst>
@@ -8407,7 +8520,7 @@
 </p:sld>
 </file>
 
-<file path=ppt/slides/slide43.xml><?xml version="1.0" encoding="utf-8"?>
+<file path=ppt/slides/slide45.xml><?xml version="1.0" encoding="utf-8"?>
 <p:sld xmlns:a="http://schemas.openxmlformats.org/drawingml/2006/main" xmlns:r="http://schemas.openxmlformats.org/officeDocument/2006/relationships" xmlns:p="http://schemas.openxmlformats.org/presentationml/2006/main">
   <p:cSld>
     <p:spTree>
@@ -8494,7 +8607,7 @@
 </p:sld>
 </file>
 
-<file path=ppt/slides/slide44.xml><?xml version="1.0" encoding="utf-8"?>
+<file path=ppt/slides/slide46.xml><?xml version="1.0" encoding="utf-8"?>
 <p:sld xmlns:a="http://schemas.openxmlformats.org/drawingml/2006/main" xmlns:r="http://schemas.openxmlformats.org/officeDocument/2006/relationships" xmlns:p="http://schemas.openxmlformats.org/presentationml/2006/main">
   <p:cSld>
     <p:spTree>
@@ -8592,7 +8705,94 @@
 </p:sld>
 </file>
 
-<file path=ppt/slides/slide45.xml><?xml version="1.0" encoding="utf-8"?>
+<file path=ppt/slides/slide47.xml><?xml version="1.0" encoding="utf-8"?>
+<p:sld xmlns:a="http://schemas.openxmlformats.org/drawingml/2006/main" xmlns:r="http://schemas.openxmlformats.org/officeDocument/2006/relationships" xmlns:p="http://schemas.openxmlformats.org/presentationml/2006/main">
+  <p:cSld>
+    <p:spTree>
+      <p:nvGrpSpPr>
+        <p:cNvPr id="1" name=""/>
+        <p:cNvGrpSpPr/>
+        <p:nvPr/>
+      </p:nvGrpSpPr>
+      <p:grpSpPr>
+        <a:xfrm>
+          <a:off x="0" y="0"/>
+          <a:ext cx="0" cy="0"/>
+          <a:chOff x="0" y="0"/>
+          <a:chExt cx="0" cy="0"/>
+        </a:xfrm>
+      </p:grpSpPr>
+      <p:sp>
+        <p:nvSpPr>
+          <p:cNvPr id="2" name="Title 1">
+            <a:extLst>
+              <a:ext uri="{FF2B5EF4-FFF2-40B4-BE49-F238E27FC236}">
+                <a16:creationId xmlns:a16="http://schemas.microsoft.com/office/drawing/2014/main" id="{B5161A77-1F3A-5E49-9D67-7C800AAECAAC}"/>
+              </a:ext>
+            </a:extLst>
+          </p:cNvPr>
+          <p:cNvSpPr>
+            <a:spLocks noGrp="1"/>
+          </p:cNvSpPr>
+          <p:nvPr>
+            <p:ph type="title"/>
+          </p:nvPr>
+        </p:nvSpPr>
+        <p:spPr/>
+        <p:txBody>
+          <a:bodyPr/>
+          <a:lstStyle/>
+          <a:p>
+            <a:r>
+              <a:rPr lang="en-US" dirty="0"/>
+              <a:t>Questions</a:t>
+            </a:r>
+          </a:p>
+        </p:txBody>
+      </p:sp>
+      <p:pic>
+        <p:nvPicPr>
+          <p:cNvPr id="5" name="Content Placeholder 4">
+            <a:extLst>
+              <a:ext uri="{FF2B5EF4-FFF2-40B4-BE49-F238E27FC236}">
+                <a16:creationId xmlns:a16="http://schemas.microsoft.com/office/drawing/2014/main" id="{8CEA90B8-FC50-0741-8F24-2E26B0B3F7EE}"/>
+              </a:ext>
+            </a:extLst>
+          </p:cNvPr>
+          <p:cNvPicPr>
+            <a:picLocks noGrp="1" noChangeAspect="1"/>
+          </p:cNvPicPr>
+          <p:nvPr>
+            <p:ph idx="1"/>
+          </p:nvPr>
+        </p:nvPicPr>
+        <p:blipFill>
+          <a:blip r:embed="rId2"/>
+          <a:stretch>
+            <a:fillRect/>
+          </a:stretch>
+        </p:blipFill>
+        <p:spPr>
+          <a:xfrm>
+            <a:off x="2524567" y="1884985"/>
+            <a:ext cx="6468962" cy="4973015"/>
+          </a:xfrm>
+        </p:spPr>
+      </p:pic>
+    </p:spTree>
+    <p:extLst>
+      <p:ext uri="{BB962C8B-B14F-4D97-AF65-F5344CB8AC3E}">
+        <p14:creationId xmlns:p14="http://schemas.microsoft.com/office/powerpoint/2010/main" val="197347564"/>
+      </p:ext>
+    </p:extLst>
+  </p:cSld>
+  <p:clrMapOvr>
+    <a:masterClrMapping/>
+  </p:clrMapOvr>
+</p:sld>
+</file>
+
+<file path=ppt/slides/slide48.xml><?xml version="1.0" encoding="utf-8"?>
 <p:sld xmlns:a="http://schemas.openxmlformats.org/drawingml/2006/main" xmlns:r="http://schemas.openxmlformats.org/officeDocument/2006/relationships" xmlns:p="http://schemas.openxmlformats.org/presentationml/2006/main">
   <p:cSld>
     <p:spTree>
@@ -8611,10 +8811,10 @@
       </p:grpSpPr>
       <p:pic>
         <p:nvPicPr>
-          <p:cNvPr id="4" name="Picture 3">
+          <p:cNvPr id="3" name="Picture 2">
             <a:extLst>
               <a:ext uri="{FF2B5EF4-FFF2-40B4-BE49-F238E27FC236}">
-                <a16:creationId xmlns:a16="http://schemas.microsoft.com/office/drawing/2014/main" id="{44EE59F8-CCE4-2445-A7DC-554623115B45}"/>
+                <a16:creationId xmlns:a16="http://schemas.microsoft.com/office/drawing/2014/main" id="{2170E0A1-A64E-944F-A717-D21C55864367}"/>
               </a:ext>
             </a:extLst>
           </p:cNvPr>
@@ -8642,7 +8842,7 @@
     </p:spTree>
     <p:extLst>
       <p:ext uri="{BB962C8B-B14F-4D97-AF65-F5344CB8AC3E}">
-        <p14:creationId xmlns:p14="http://schemas.microsoft.com/office/powerpoint/2010/main" val="3261814379"/>
+        <p14:creationId xmlns:p14="http://schemas.microsoft.com/office/powerpoint/2010/main" val="3795071130"/>
       </p:ext>
     </p:extLst>
   </p:cSld>
@@ -8652,7 +8852,7 @@
 </p:sld>
 </file>
 
-<file path=ppt/slides/slide46.xml><?xml version="1.0" encoding="utf-8"?>
+<file path=ppt/slides/slide5.xml><?xml version="1.0" encoding="utf-8"?>
 <p:sld xmlns:a="http://schemas.openxmlformats.org/drawingml/2006/main" xmlns:r="http://schemas.openxmlformats.org/officeDocument/2006/relationships" xmlns:p="http://schemas.openxmlformats.org/presentationml/2006/main">
   <p:cSld>
     <p:spTree>
@@ -8669,40 +8869,84 @@
           <a:chExt cx="0" cy="0"/>
         </a:xfrm>
       </p:grpSpPr>
-      <p:pic>
-        <p:nvPicPr>
-          <p:cNvPr id="6" name="Picture 5">
+      <p:sp>
+        <p:nvSpPr>
+          <p:cNvPr id="2" name="Title 1">
             <a:extLst>
               <a:ext uri="{FF2B5EF4-FFF2-40B4-BE49-F238E27FC236}">
-                <a16:creationId xmlns:a16="http://schemas.microsoft.com/office/drawing/2014/main" id="{E6FD2E3B-1D9F-1F4C-83B7-9BD8C6E8B382}"/>
+                <a16:creationId xmlns:a16="http://schemas.microsoft.com/office/drawing/2014/main" id="{1A3F4E8B-BDD4-F241-ADDD-54B5F6AD92C2}"/>
               </a:ext>
             </a:extLst>
           </p:cNvPr>
-          <p:cNvPicPr>
-            <a:picLocks noChangeAspect="1"/>
-          </p:cNvPicPr>
-          <p:nvPr/>
-        </p:nvPicPr>
-        <p:blipFill>
-          <a:blip r:embed="rId3"/>
-          <a:stretch>
-            <a:fillRect/>
-          </a:stretch>
-        </p:blipFill>
-        <p:spPr>
-          <a:xfrm>
-            <a:off x="0" y="0"/>
-            <a:ext cx="12192000" cy="6858000"/>
-          </a:xfrm>
-          <a:prstGeom prst="rect">
-            <a:avLst/>
-          </a:prstGeom>
-        </p:spPr>
-      </p:pic>
+          <p:cNvSpPr>
+            <a:spLocks noGrp="1"/>
+          </p:cNvSpPr>
+          <p:nvPr>
+            <p:ph type="title"/>
+          </p:nvPr>
+        </p:nvSpPr>
+        <p:spPr/>
+        <p:txBody>
+          <a:bodyPr/>
+          <a:lstStyle/>
+          <a:p>
+            <a:r>
+              <a:rPr lang="en-US" dirty="0"/>
+              <a:t>What the application Does</a:t>
+            </a:r>
+          </a:p>
+        </p:txBody>
+      </p:sp>
+      <p:sp>
+        <p:nvSpPr>
+          <p:cNvPr id="3" name="Content Placeholder 2">
+            <a:extLst>
+              <a:ext uri="{FF2B5EF4-FFF2-40B4-BE49-F238E27FC236}">
+                <a16:creationId xmlns:a16="http://schemas.microsoft.com/office/drawing/2014/main" id="{3D113710-C11F-0048-B9E1-61400E1EF662}"/>
+              </a:ext>
+            </a:extLst>
+          </p:cNvPr>
+          <p:cNvSpPr>
+            <a:spLocks noGrp="1"/>
+          </p:cNvSpPr>
+          <p:nvPr>
+            <p:ph idx="1"/>
+          </p:nvPr>
+        </p:nvSpPr>
+        <p:spPr/>
+        <p:txBody>
+          <a:bodyPr/>
+          <a:lstStyle/>
+          <a:p>
+            <a:r>
+              <a:rPr lang="en-US" dirty="0"/>
+              <a:t>Collect Engine Data</a:t>
+            </a:r>
+          </a:p>
+          <a:p>
+            <a:r>
+              <a:rPr lang="en-US" dirty="0"/>
+              <a:t>Submit to Cloud</a:t>
+            </a:r>
+          </a:p>
+          <a:p>
+            <a:r>
+              <a:rPr lang="en-US" dirty="0"/>
+              <a:t>Process and Store Data</a:t>
+            </a:r>
+          </a:p>
+          <a:p>
+            <a:r>
+              <a:rPr lang="en-US" dirty="0"/>
+              <a:t>Report via Web application</a:t>
+            </a:r>
+          </a:p>
+        </p:txBody>
+      </p:sp>
     </p:spTree>
     <p:extLst>
       <p:ext uri="{BB962C8B-B14F-4D97-AF65-F5344CB8AC3E}">
-        <p14:creationId xmlns:p14="http://schemas.microsoft.com/office/powerpoint/2010/main" val="2221428852"/>
+        <p14:creationId xmlns:p14="http://schemas.microsoft.com/office/powerpoint/2010/main" val="293339291"/>
       </p:ext>
     </p:extLst>
   </p:cSld>
@@ -8712,7 +8956,7 @@
 </p:sld>
 </file>
 
-<file path=ppt/slides/slide47.xml><?xml version="1.0" encoding="utf-8"?>
+<file path=ppt/slides/slide6.xml><?xml version="1.0" encoding="utf-8"?>
 <p:sld xmlns:a="http://schemas.openxmlformats.org/drawingml/2006/main" xmlns:r="http://schemas.openxmlformats.org/officeDocument/2006/relationships" xmlns:p="http://schemas.openxmlformats.org/presentationml/2006/main">
   <p:cSld>
     <p:spTree>
@@ -8734,7 +8978,7 @@
           <p:cNvPr id="2" name="Title 1">
             <a:extLst>
               <a:ext uri="{FF2B5EF4-FFF2-40B4-BE49-F238E27FC236}">
-                <a16:creationId xmlns:a16="http://schemas.microsoft.com/office/drawing/2014/main" id="{B5161A77-1F3A-5E49-9D67-7C800AAECAAC}"/>
+                <a16:creationId xmlns:a16="http://schemas.microsoft.com/office/drawing/2014/main" id="{5A26ABA6-20EE-7C41-9699-BC0B23CBC319}"/>
               </a:ext>
             </a:extLst>
           </p:cNvPr>
@@ -8752,7 +8996,7 @@
           <a:p>
             <a:r>
               <a:rPr lang="en-US" dirty="0"/>
-              <a:t>Questions</a:t>
+              <a:t>Example of use</a:t>
             </a:r>
           </a:p>
         </p:txBody>
@@ -8762,7 +9006,7 @@
           <p:cNvPr id="5" name="Content Placeholder 4">
             <a:extLst>
               <a:ext uri="{FF2B5EF4-FFF2-40B4-BE49-F238E27FC236}">
-                <a16:creationId xmlns:a16="http://schemas.microsoft.com/office/drawing/2014/main" id="{8CEA90B8-FC50-0741-8F24-2E26B0B3F7EE}"/>
+                <a16:creationId xmlns:a16="http://schemas.microsoft.com/office/drawing/2014/main" id="{56C35B7B-A3BC-BE40-A932-CD26DA4FE704}"/>
               </a:ext>
             </a:extLst>
           </p:cNvPr>
@@ -8781,15 +9025,15 @@
         </p:blipFill>
         <p:spPr>
           <a:xfrm>
-            <a:off x="2524567" y="1884985"/>
-            <a:ext cx="6468962" cy="4973015"/>
+            <a:off x="2042085" y="1863982"/>
+            <a:ext cx="7348706" cy="4788743"/>
           </a:xfrm>
         </p:spPr>
       </p:pic>
     </p:spTree>
     <p:extLst>
       <p:ext uri="{BB962C8B-B14F-4D97-AF65-F5344CB8AC3E}">
-        <p14:creationId xmlns:p14="http://schemas.microsoft.com/office/powerpoint/2010/main" val="197347564"/>
+        <p14:creationId xmlns:p14="http://schemas.microsoft.com/office/powerpoint/2010/main" val="3274534005"/>
       </p:ext>
     </p:extLst>
   </p:cSld>
@@ -8799,7 +9043,7 @@
 </p:sld>
 </file>
 
-<file path=ppt/slides/slide5.xml><?xml version="1.0" encoding="utf-8"?>
+<file path=ppt/slides/slide7.xml><?xml version="1.0" encoding="utf-8"?>
 <p:sld xmlns:a="http://schemas.openxmlformats.org/drawingml/2006/main" xmlns:r="http://schemas.openxmlformats.org/officeDocument/2006/relationships" xmlns:p="http://schemas.openxmlformats.org/presentationml/2006/main">
   <p:cSld>
     <p:spTree>
@@ -8886,208 +9130,6 @@
 </p:sld>
 </file>
 
-<file path=ppt/slides/slide6.xml><?xml version="1.0" encoding="utf-8"?>
-<p:sld xmlns:a="http://schemas.openxmlformats.org/drawingml/2006/main" xmlns:r="http://schemas.openxmlformats.org/officeDocument/2006/relationships" xmlns:p="http://schemas.openxmlformats.org/presentationml/2006/main">
-  <p:cSld>
-    <p:spTree>
-      <p:nvGrpSpPr>
-        <p:cNvPr id="1" name=""/>
-        <p:cNvGrpSpPr/>
-        <p:nvPr/>
-      </p:nvGrpSpPr>
-      <p:grpSpPr>
-        <a:xfrm>
-          <a:off x="0" y="0"/>
-          <a:ext cx="0" cy="0"/>
-          <a:chOff x="0" y="0"/>
-          <a:chExt cx="0" cy="0"/>
-        </a:xfrm>
-      </p:grpSpPr>
-      <p:sp>
-        <p:nvSpPr>
-          <p:cNvPr id="2" name="Title 1">
-            <a:extLst>
-              <a:ext uri="{FF2B5EF4-FFF2-40B4-BE49-F238E27FC236}">
-                <a16:creationId xmlns:a16="http://schemas.microsoft.com/office/drawing/2014/main" id="{49645C4B-626D-4141-8434-F2280F3D5DD2}"/>
-              </a:ext>
-            </a:extLst>
-          </p:cNvPr>
-          <p:cNvSpPr>
-            <a:spLocks noGrp="1"/>
-          </p:cNvSpPr>
-          <p:nvPr>
-            <p:ph type="title"/>
-          </p:nvPr>
-        </p:nvSpPr>
-        <p:spPr/>
-        <p:txBody>
-          <a:bodyPr/>
-          <a:lstStyle/>
-          <a:p>
-            <a:r>
-              <a:rPr lang="en-US" dirty="0"/>
-              <a:t>Why change it</a:t>
-            </a:r>
-          </a:p>
-        </p:txBody>
-      </p:sp>
-      <p:sp>
-        <p:nvSpPr>
-          <p:cNvPr id="3" name="Content Placeholder 2">
-            <a:extLst>
-              <a:ext uri="{FF2B5EF4-FFF2-40B4-BE49-F238E27FC236}">
-                <a16:creationId xmlns:a16="http://schemas.microsoft.com/office/drawing/2014/main" id="{6918CE19-71C1-AC4B-B001-61F675BB293B}"/>
-              </a:ext>
-            </a:extLst>
-          </p:cNvPr>
-          <p:cNvSpPr>
-            <a:spLocks noGrp="1"/>
-          </p:cNvSpPr>
-          <p:nvPr>
-            <p:ph idx="1"/>
-          </p:nvPr>
-        </p:nvSpPr>
-        <p:spPr/>
-        <p:txBody>
-          <a:bodyPr/>
-          <a:lstStyle/>
-          <a:p>
-            <a:r>
-              <a:rPr lang="en-US" dirty="0"/>
-              <a:t>Not Scalable</a:t>
-            </a:r>
-          </a:p>
-          <a:p>
-            <a:r>
-              <a:rPr lang="en-US" dirty="0"/>
-              <a:t>Synchronous</a:t>
-            </a:r>
-          </a:p>
-          <a:p>
-            <a:r>
-              <a:rPr lang="en-US" dirty="0"/>
-              <a:t>SQL Performance Issues with main Application</a:t>
-            </a:r>
-          </a:p>
-          <a:p>
-            <a:r>
-              <a:rPr lang="en-US" dirty="0"/>
-              <a:t>Tightly Coupled to main Application</a:t>
-            </a:r>
-          </a:p>
-        </p:txBody>
-      </p:sp>
-    </p:spTree>
-    <p:extLst>
-      <p:ext uri="{BB962C8B-B14F-4D97-AF65-F5344CB8AC3E}">
-        <p14:creationId xmlns:p14="http://schemas.microsoft.com/office/powerpoint/2010/main" val="1899858073"/>
-      </p:ext>
-    </p:extLst>
-  </p:cSld>
-  <p:clrMapOvr>
-    <a:masterClrMapping/>
-  </p:clrMapOvr>
-</p:sld>
-</file>
-
-<file path=ppt/slides/slide7.xml><?xml version="1.0" encoding="utf-8"?>
-<p:sld xmlns:a="http://schemas.openxmlformats.org/drawingml/2006/main" xmlns:r="http://schemas.openxmlformats.org/officeDocument/2006/relationships" xmlns:p="http://schemas.openxmlformats.org/presentationml/2006/main">
-  <p:cSld>
-    <p:spTree>
-      <p:nvGrpSpPr>
-        <p:cNvPr id="1" name=""/>
-        <p:cNvGrpSpPr/>
-        <p:nvPr/>
-      </p:nvGrpSpPr>
-      <p:grpSpPr>
-        <a:xfrm>
-          <a:off x="0" y="0"/>
-          <a:ext cx="0" cy="0"/>
-          <a:chOff x="0" y="0"/>
-          <a:chExt cx="0" cy="0"/>
-        </a:xfrm>
-      </p:grpSpPr>
-      <p:sp>
-        <p:nvSpPr>
-          <p:cNvPr id="2" name="Title 1">
-            <a:extLst>
-              <a:ext uri="{FF2B5EF4-FFF2-40B4-BE49-F238E27FC236}">
-                <a16:creationId xmlns:a16="http://schemas.microsoft.com/office/drawing/2014/main" id="{0C4966F9-5A27-844E-9066-6DFA1C7BCCA1}"/>
-              </a:ext>
-            </a:extLst>
-          </p:cNvPr>
-          <p:cNvSpPr>
-            <a:spLocks noGrp="1"/>
-          </p:cNvSpPr>
-          <p:nvPr>
-            <p:ph type="title"/>
-          </p:nvPr>
-        </p:nvSpPr>
-        <p:spPr/>
-        <p:txBody>
-          <a:bodyPr/>
-          <a:lstStyle/>
-          <a:p>
-            <a:r>
-              <a:rPr lang="en-US" dirty="0"/>
-              <a:t>Ingestion of Data - Concerns</a:t>
-            </a:r>
-          </a:p>
-        </p:txBody>
-      </p:sp>
-      <p:sp>
-        <p:nvSpPr>
-          <p:cNvPr id="3" name="Content Placeholder 2">
-            <a:extLst>
-              <a:ext uri="{FF2B5EF4-FFF2-40B4-BE49-F238E27FC236}">
-                <a16:creationId xmlns:a16="http://schemas.microsoft.com/office/drawing/2014/main" id="{49122ADB-6DEA-614F-BC6F-CD5220C03030}"/>
-              </a:ext>
-            </a:extLst>
-          </p:cNvPr>
-          <p:cNvSpPr>
-            <a:spLocks noGrp="1"/>
-          </p:cNvSpPr>
-          <p:nvPr>
-            <p:ph idx="1"/>
-          </p:nvPr>
-        </p:nvSpPr>
-        <p:spPr/>
-        <p:txBody>
-          <a:bodyPr/>
-          <a:lstStyle/>
-          <a:p>
-            <a:r>
-              <a:rPr lang="en-US" dirty="0"/>
-              <a:t>Speed of Response to Device</a:t>
-            </a:r>
-          </a:p>
-          <a:p>
-            <a:r>
-              <a:rPr lang="en-US" dirty="0"/>
-              <a:t>Scalability</a:t>
-            </a:r>
-          </a:p>
-          <a:p>
-            <a:r>
-              <a:rPr lang="en-US" dirty="0"/>
-              <a:t>Security</a:t>
-            </a:r>
-          </a:p>
-        </p:txBody>
-      </p:sp>
-    </p:spTree>
-    <p:extLst>
-      <p:ext uri="{BB962C8B-B14F-4D97-AF65-F5344CB8AC3E}">
-        <p14:creationId xmlns:p14="http://schemas.microsoft.com/office/powerpoint/2010/main" val="3010413885"/>
-      </p:ext>
-    </p:extLst>
-  </p:cSld>
-  <p:clrMapOvr>
-    <a:masterClrMapping/>
-  </p:clrMapOvr>
-</p:sld>
-</file>
-
 <file path=ppt/slides/slide8.xml><?xml version="1.0" encoding="utf-8"?>
 <p:sld xmlns:a="http://schemas.openxmlformats.org/drawingml/2006/main" xmlns:r="http://schemas.openxmlformats.org/officeDocument/2006/relationships" xmlns:p="http://schemas.openxmlformats.org/presentationml/2006/main">
   <p:cSld>
@@ -9110,7 +9152,7 @@
           <p:cNvPr id="2" name="Title 1">
             <a:extLst>
               <a:ext uri="{FF2B5EF4-FFF2-40B4-BE49-F238E27FC236}">
-                <a16:creationId xmlns:a16="http://schemas.microsoft.com/office/drawing/2014/main" id="{48105764-B365-9246-AF58-F3DF2CBFCD01}"/>
+                <a16:creationId xmlns:a16="http://schemas.microsoft.com/office/drawing/2014/main" id="{49645C4B-626D-4141-8434-F2280F3D5DD2}"/>
               </a:ext>
             </a:extLst>
           </p:cNvPr>
@@ -9128,7 +9170,7 @@
           <a:p>
             <a:r>
               <a:rPr lang="en-US" dirty="0"/>
-              <a:t>Ingestion of Data – Custom API</a:t>
+              <a:t>Why change it</a:t>
             </a:r>
           </a:p>
         </p:txBody>
@@ -9138,7 +9180,7 @@
           <p:cNvPr id="3" name="Content Placeholder 2">
             <a:extLst>
               <a:ext uri="{FF2B5EF4-FFF2-40B4-BE49-F238E27FC236}">
-                <a16:creationId xmlns:a16="http://schemas.microsoft.com/office/drawing/2014/main" id="{24FDF6E4-1DBE-AE40-9E47-37DC7B63F8C9}"/>
+                <a16:creationId xmlns:a16="http://schemas.microsoft.com/office/drawing/2014/main" id="{6918CE19-71C1-AC4B-B001-61F675BB293B}"/>
               </a:ext>
             </a:extLst>
           </p:cNvPr>
@@ -9156,25 +9198,25 @@
           <a:p>
             <a:r>
               <a:rPr lang="en-US" dirty="0"/>
-              <a:t>All concerns could be handled</a:t>
-            </a:r>
-          </a:p>
-          <a:p>
-            <a:r>
-              <a:rPr lang="en-US" dirty="0"/>
-              <a:t>Newer and Better version of existing</a:t>
-            </a:r>
-          </a:p>
-          <a:p>
-            <a:r>
-              <a:rPr lang="en-US" dirty="0"/>
-              <a:t>Code and deployments for something that wasn’t doing much</a:t>
-            </a:r>
-          </a:p>
-          <a:p>
-            <a:r>
-              <a:rPr lang="en-US" dirty="0"/>
-              <a:t>Never truly considered</a:t>
+              <a:t>Not Scalable</a:t>
+            </a:r>
+          </a:p>
+          <a:p>
+            <a:r>
+              <a:rPr lang="en-US" dirty="0"/>
+              <a:t>Synchronous</a:t>
+            </a:r>
+          </a:p>
+          <a:p>
+            <a:r>
+              <a:rPr lang="en-US" dirty="0"/>
+              <a:t>SQL Performance Issues with main Application</a:t>
+            </a:r>
+          </a:p>
+          <a:p>
+            <a:r>
+              <a:rPr lang="en-US" dirty="0"/>
+              <a:t>Tightly Coupled to main Application</a:t>
             </a:r>
           </a:p>
         </p:txBody>
@@ -9182,7 +9224,7 @@
     </p:spTree>
     <p:extLst>
       <p:ext uri="{BB962C8B-B14F-4D97-AF65-F5344CB8AC3E}">
-        <p14:creationId xmlns:p14="http://schemas.microsoft.com/office/powerpoint/2010/main" val="3761287738"/>
+        <p14:creationId xmlns:p14="http://schemas.microsoft.com/office/powerpoint/2010/main" val="1899858073"/>
       </p:ext>
     </p:extLst>
   </p:cSld>
@@ -9214,7 +9256,7 @@
           <p:cNvPr id="2" name="Title 1">
             <a:extLst>
               <a:ext uri="{FF2B5EF4-FFF2-40B4-BE49-F238E27FC236}">
-                <a16:creationId xmlns:a16="http://schemas.microsoft.com/office/drawing/2014/main" id="{C106B637-AF70-F847-BDA0-CC67479BED8D}"/>
+                <a16:creationId xmlns:a16="http://schemas.microsoft.com/office/drawing/2014/main" id="{0C4966F9-5A27-844E-9066-6DFA1C7BCCA1}"/>
               </a:ext>
             </a:extLst>
           </p:cNvPr>
@@ -9232,7 +9274,7 @@
           <a:p>
             <a:r>
               <a:rPr lang="en-US" dirty="0"/>
-              <a:t>Ingestion of Data – Event Hub</a:t>
+              <a:t>Ingestion of Data - Concerns</a:t>
             </a:r>
           </a:p>
         </p:txBody>
@@ -9242,7 +9284,7 @@
           <p:cNvPr id="3" name="Content Placeholder 2">
             <a:extLst>
               <a:ext uri="{FF2B5EF4-FFF2-40B4-BE49-F238E27FC236}">
-                <a16:creationId xmlns:a16="http://schemas.microsoft.com/office/drawing/2014/main" id="{2182C7E6-F6FD-E54F-8D47-F427F2C947F2}"/>
+                <a16:creationId xmlns:a16="http://schemas.microsoft.com/office/drawing/2014/main" id="{49122ADB-6DEA-614F-BC6F-CD5220C03030}"/>
               </a:ext>
             </a:extLst>
           </p:cNvPr>
@@ -9260,25 +9302,19 @@
           <a:p>
             <a:r>
               <a:rPr lang="en-US" dirty="0"/>
-              <a:t>What is Designed for</a:t>
-            </a:r>
-          </a:p>
-          <a:p>
-            <a:r>
-              <a:rPr lang="en-US" dirty="0"/>
-              <a:t>Service not Code</a:t>
-            </a:r>
-          </a:p>
-          <a:p>
-            <a:r>
-              <a:rPr lang="en-US" dirty="0"/>
-              <a:t>Routing and Endpoints</a:t>
-            </a:r>
-          </a:p>
-          <a:p>
-            <a:r>
-              <a:rPr lang="en-US" dirty="0"/>
-              <a:t>Security – Custom work would have been needed</a:t>
+              <a:t>Speed of Response to Device</a:t>
+            </a:r>
+          </a:p>
+          <a:p>
+            <a:r>
+              <a:rPr lang="en-US" dirty="0"/>
+              <a:t>Scalability</a:t>
+            </a:r>
+          </a:p>
+          <a:p>
+            <a:r>
+              <a:rPr lang="en-US" dirty="0"/>
+              <a:t>Security</a:t>
             </a:r>
           </a:p>
         </p:txBody>
@@ -9286,7 +9322,7 @@
     </p:spTree>
     <p:extLst>
       <p:ext uri="{BB962C8B-B14F-4D97-AF65-F5344CB8AC3E}">
-        <p14:creationId xmlns:p14="http://schemas.microsoft.com/office/powerpoint/2010/main" val="710905023"/>
+        <p14:creationId xmlns:p14="http://schemas.microsoft.com/office/powerpoint/2010/main" val="3010413885"/>
       </p:ext>
     </p:extLst>
   </p:cSld>

</xml_diff>